<commit_message>
Add more git rebase examples.
</commit_message>
<xml_diff>
--- a/GitRebase.pptx
+++ b/GitRebase.pptx
@@ -5,10 +5,16 @@
     <p:sldMasterId id="2147483648" r:id="rId1"/>
   </p:sldMasterIdLst>
   <p:sldIdLst>
-    <p:sldId id="257" r:id="rId2"/>
-    <p:sldId id="258" r:id="rId3"/>
-    <p:sldId id="259" r:id="rId4"/>
+    <p:sldId id="261" r:id="rId2"/>
+    <p:sldId id="257" r:id="rId3"/>
+    <p:sldId id="258" r:id="rId4"/>
     <p:sldId id="260" r:id="rId5"/>
+    <p:sldId id="262" r:id="rId6"/>
+    <p:sldId id="263" r:id="rId7"/>
+    <p:sldId id="265" r:id="rId8"/>
+    <p:sldId id="266" r:id="rId9"/>
+    <p:sldId id="259" r:id="rId10"/>
+    <p:sldId id="264" r:id="rId11"/>
   </p:sldIdLst>
   <p:sldSz cx="9144000" cy="6858000" type="screen4x3"/>
   <p:notesSz cx="6858000" cy="9144000"/>
@@ -3108,6 +3114,227 @@
             <p:ph type="title"/>
           </p:nvPr>
         </p:nvSpPr>
+        <p:spPr>
+          <a:xfrm>
+            <a:off x="467544" y="2636912"/>
+            <a:ext cx="8229600" cy="1143000"/>
+          </a:xfrm>
+        </p:spPr>
+        <p:txBody>
+          <a:bodyPr>
+            <a:normAutofit fontScale="90000"/>
+          </a:bodyPr>
+          <a:lstStyle/>
+          <a:p>
+            <a:r>
+              <a:rPr lang="da-DK" dirty="0" smtClean="0"/>
+              <a:t>GIT as a </a:t>
+            </a:r>
+            <a:r>
+              <a:rPr lang="da-DK" dirty="0" err="1" smtClean="0"/>
+              <a:t>chronological</a:t>
+            </a:r>
+            <a:r>
+              <a:rPr lang="da-DK" dirty="0" smtClean="0"/>
+              <a:t> </a:t>
+            </a:r>
+            <a:r>
+              <a:rPr lang="da-DK" dirty="0" err="1" smtClean="0"/>
+              <a:t>versioning</a:t>
+            </a:r>
+            <a:r>
+              <a:rPr lang="da-DK" dirty="0" smtClean="0"/>
+              <a:t> </a:t>
+            </a:r>
+            <a:r>
+              <a:rPr lang="da-DK" dirty="0" err="1" smtClean="0"/>
+              <a:t>tool</a:t>
+            </a:r>
+            <a:r>
+              <a:rPr lang="da-DK" dirty="0" smtClean="0"/>
+              <a:t> with </a:t>
+            </a:r>
+            <a:r>
+              <a:rPr lang="da-DK" dirty="0" err="1" smtClean="0"/>
+              <a:t>historical</a:t>
+            </a:r>
+            <a:r>
+              <a:rPr lang="da-DK" dirty="0" smtClean="0"/>
+              <a:t> </a:t>
+            </a:r>
+            <a:r>
+              <a:rPr lang="da-DK" dirty="0" err="1" smtClean="0"/>
+              <a:t>correctness</a:t>
+            </a:r>
+            <a:endParaRPr lang="da-DK" dirty="0"/>
+          </a:p>
+        </p:txBody>
+      </p:sp>
+    </p:spTree>
+    <p:extLst>
+      <p:ext uri="{BB962C8B-B14F-4D97-AF65-F5344CB8AC3E}">
+        <p14:creationId xmlns:p14="http://schemas.microsoft.com/office/powerpoint/2010/main" val="2352298499"/>
+      </p:ext>
+    </p:extLst>
+  </p:cSld>
+  <p:clrMapOvr>
+    <a:masterClrMapping/>
+  </p:clrMapOvr>
+  <p:timing>
+    <p:tnLst>
+      <p:par>
+        <p:cTn id="1" dur="indefinite" restart="never" nodeType="tmRoot"/>
+      </p:par>
+    </p:tnLst>
+  </p:timing>
+</p:sld>
+</file>
+
+<file path=ppt/slides/slide10.xml><?xml version="1.0" encoding="utf-8"?>
+<p:sld xmlns:a="http://schemas.openxmlformats.org/drawingml/2006/main" xmlns:r="http://schemas.openxmlformats.org/officeDocument/2006/relationships" xmlns:p="http://schemas.openxmlformats.org/presentationml/2006/main">
+  <p:cSld>
+    <p:spTree>
+      <p:nvGrpSpPr>
+        <p:cNvPr id="1" name=""/>
+        <p:cNvGrpSpPr/>
+        <p:nvPr/>
+      </p:nvGrpSpPr>
+      <p:grpSpPr>
+        <a:xfrm>
+          <a:off x="0" y="0"/>
+          <a:ext cx="0" cy="0"/>
+          <a:chOff x="0" y="0"/>
+          <a:chExt cx="0" cy="0"/>
+        </a:xfrm>
+      </p:grpSpPr>
+      <p:sp>
+        <p:nvSpPr>
+          <p:cNvPr id="2" name="Title 1"/>
+          <p:cNvSpPr>
+            <a:spLocks noGrp="1"/>
+          </p:cNvSpPr>
+          <p:nvPr>
+            <p:ph type="title"/>
+          </p:nvPr>
+        </p:nvSpPr>
+        <p:spPr>
+          <a:xfrm>
+            <a:off x="467544" y="2636912"/>
+            <a:ext cx="8229600" cy="1143000"/>
+          </a:xfrm>
+        </p:spPr>
+        <p:txBody>
+          <a:bodyPr>
+            <a:normAutofit fontScale="90000"/>
+          </a:bodyPr>
+          <a:lstStyle/>
+          <a:p>
+            <a:r>
+              <a:rPr lang="da-DK" dirty="0" smtClean="0"/>
+              <a:t>GIT as </a:t>
+            </a:r>
+            <a:r>
+              <a:rPr lang="da-DK" dirty="0" err="1" smtClean="0"/>
+              <a:t>your</a:t>
+            </a:r>
+            <a:r>
+              <a:rPr lang="da-DK" dirty="0" smtClean="0"/>
+              <a:t> </a:t>
+            </a:r>
+            <a:r>
+              <a:rPr lang="da-DK" dirty="0" err="1" smtClean="0"/>
+              <a:t>best</a:t>
+            </a:r>
+            <a:r>
+              <a:rPr lang="da-DK" dirty="0" smtClean="0"/>
+              <a:t> </a:t>
+            </a:r>
+            <a:r>
+              <a:rPr lang="da-DK" dirty="0" err="1" smtClean="0"/>
+              <a:t>friend</a:t>
+            </a:r>
+            <a:r>
+              <a:rPr lang="da-DK" dirty="0" smtClean="0"/>
+              <a:t/>
+            </a:r>
+            <a:br>
+              <a:rPr lang="da-DK" dirty="0" smtClean="0"/>
+            </a:br>
+            <a:r>
+              <a:rPr lang="da-DK" dirty="0" smtClean="0"/>
+              <a:t>with </a:t>
+            </a:r>
+            <a:r>
+              <a:rPr lang="da-DK" dirty="0" err="1" smtClean="0"/>
+              <a:t>complete</a:t>
+            </a:r>
+            <a:r>
+              <a:rPr lang="da-DK" dirty="0" smtClean="0"/>
+              <a:t> </a:t>
+            </a:r>
+            <a:r>
+              <a:rPr lang="da-DK" dirty="0" err="1" smtClean="0"/>
+              <a:t>control</a:t>
+            </a:r>
+            <a:r>
+              <a:rPr lang="da-DK" dirty="0" smtClean="0"/>
+              <a:t> over </a:t>
+            </a:r>
+            <a:r>
+              <a:rPr lang="da-DK" dirty="0" err="1" smtClean="0"/>
+              <a:t>changes</a:t>
+            </a:r>
+            <a:endParaRPr lang="da-DK" dirty="0"/>
+          </a:p>
+        </p:txBody>
+      </p:sp>
+    </p:spTree>
+    <p:extLst>
+      <p:ext uri="{BB962C8B-B14F-4D97-AF65-F5344CB8AC3E}">
+        <p14:creationId xmlns:p14="http://schemas.microsoft.com/office/powerpoint/2010/main" val="3406085868"/>
+      </p:ext>
+    </p:extLst>
+  </p:cSld>
+  <p:clrMapOvr>
+    <a:masterClrMapping/>
+  </p:clrMapOvr>
+  <p:timing>
+    <p:tnLst>
+      <p:par>
+        <p:cTn id="1" dur="indefinite" restart="never" nodeType="tmRoot"/>
+      </p:par>
+    </p:tnLst>
+  </p:timing>
+</p:sld>
+</file>
+
+<file path=ppt/slides/slide2.xml><?xml version="1.0" encoding="utf-8"?>
+<p:sld xmlns:a="http://schemas.openxmlformats.org/drawingml/2006/main" xmlns:r="http://schemas.openxmlformats.org/officeDocument/2006/relationships" xmlns:p="http://schemas.openxmlformats.org/presentationml/2006/main">
+  <p:cSld>
+    <p:spTree>
+      <p:nvGrpSpPr>
+        <p:cNvPr id="1" name=""/>
+        <p:cNvGrpSpPr/>
+        <p:nvPr/>
+      </p:nvGrpSpPr>
+      <p:grpSpPr>
+        <a:xfrm>
+          <a:off x="0" y="0"/>
+          <a:ext cx="0" cy="0"/>
+          <a:chOff x="0" y="0"/>
+          <a:chExt cx="0" cy="0"/>
+        </a:xfrm>
+      </p:grpSpPr>
+      <p:sp>
+        <p:nvSpPr>
+          <p:cNvPr id="2" name="Title 1"/>
+          <p:cNvSpPr>
+            <a:spLocks noGrp="1"/>
+          </p:cNvSpPr>
+          <p:nvPr>
+            <p:ph type="title"/>
+          </p:nvPr>
+        </p:nvSpPr>
         <p:spPr/>
         <p:txBody>
           <a:bodyPr>
@@ -3203,10 +3430,17 @@
   <p:clrMapOvr>
     <a:masterClrMapping/>
   </p:clrMapOvr>
+  <p:timing>
+    <p:tnLst>
+      <p:par>
+        <p:cTn id="1" dur="indefinite" restart="never" nodeType="tmRoot"/>
+      </p:par>
+    </p:tnLst>
+  </p:timing>
 </p:sld>
 </file>
 
-<file path=ppt/slides/slide2.xml><?xml version="1.0" encoding="utf-8"?>
+<file path=ppt/slides/slide3.xml><?xml version="1.0" encoding="utf-8"?>
 <p:sld xmlns:a="http://schemas.openxmlformats.org/drawingml/2006/main" xmlns:r="http://schemas.openxmlformats.org/officeDocument/2006/relationships" xmlns:p="http://schemas.openxmlformats.org/presentationml/2006/main">
   <p:cSld>
     <p:spTree>
@@ -3326,10 +3560,553 @@
   <p:clrMapOvr>
     <a:masterClrMapping/>
   </p:clrMapOvr>
+  <p:timing>
+    <p:tnLst>
+      <p:par>
+        <p:cTn id="1" dur="indefinite" restart="never" nodeType="tmRoot"/>
+      </p:par>
+    </p:tnLst>
+  </p:timing>
 </p:sld>
 </file>
 
-<file path=ppt/slides/slide3.xml><?xml version="1.0" encoding="utf-8"?>
+<file path=ppt/slides/slide4.xml><?xml version="1.0" encoding="utf-8"?>
+<p:sld xmlns:a="http://schemas.openxmlformats.org/drawingml/2006/main" xmlns:r="http://schemas.openxmlformats.org/officeDocument/2006/relationships" xmlns:p="http://schemas.openxmlformats.org/presentationml/2006/main">
+  <p:cSld>
+    <p:spTree>
+      <p:nvGrpSpPr>
+        <p:cNvPr id="1" name=""/>
+        <p:cNvGrpSpPr/>
+        <p:nvPr/>
+      </p:nvGrpSpPr>
+      <p:grpSpPr>
+        <a:xfrm>
+          <a:off x="0" y="0"/>
+          <a:ext cx="0" cy="0"/>
+          <a:chOff x="0" y="0"/>
+          <a:chExt cx="0" cy="0"/>
+        </a:xfrm>
+      </p:grpSpPr>
+      <p:sp>
+        <p:nvSpPr>
+          <p:cNvPr id="2" name="Title 1"/>
+          <p:cNvSpPr>
+            <a:spLocks noGrp="1"/>
+          </p:cNvSpPr>
+          <p:nvPr>
+            <p:ph type="title"/>
+          </p:nvPr>
+        </p:nvSpPr>
+        <p:spPr/>
+        <p:txBody>
+          <a:bodyPr>
+            <a:normAutofit/>
+          </a:bodyPr>
+          <a:lstStyle/>
+          <a:p>
+            <a:r>
+              <a:rPr lang="da-DK" dirty="0" err="1" smtClean="0"/>
+              <a:t>Two</a:t>
+            </a:r>
+            <a:r>
+              <a:rPr lang="da-DK" dirty="0" smtClean="0"/>
+              <a:t> persons </a:t>
+            </a:r>
+            <a:r>
+              <a:rPr lang="da-DK" dirty="0" err="1" smtClean="0"/>
+              <a:t>work</a:t>
+            </a:r>
+            <a:r>
+              <a:rPr lang="da-DK" dirty="0" smtClean="0"/>
+              <a:t> on </a:t>
+            </a:r>
+            <a:r>
+              <a:rPr lang="da-DK" dirty="0" err="1" smtClean="0"/>
+              <a:t>two</a:t>
+            </a:r>
+            <a:r>
+              <a:rPr lang="da-DK" dirty="0" smtClean="0"/>
+              <a:t> branches</a:t>
+            </a:r>
+            <a:endParaRPr lang="da-DK" dirty="0"/>
+          </a:p>
+        </p:txBody>
+      </p:sp>
+      <p:pic>
+        <p:nvPicPr>
+          <p:cNvPr id="4098" name="Picture 2"/>
+          <p:cNvPicPr>
+            <a:picLocks noChangeAspect="1" noChangeArrowheads="1"/>
+          </p:cNvPicPr>
+          <p:nvPr/>
+        </p:nvPicPr>
+        <p:blipFill>
+          <a:blip r:embed="rId2">
+            <a:extLst>
+              <a:ext uri="{28A0092B-C50C-407E-A947-70E740481C1C}">
+                <a14:useLocalDpi xmlns:a14="http://schemas.microsoft.com/office/drawing/2010/main" val="0"/>
+              </a:ext>
+            </a:extLst>
+          </a:blip>
+          <a:srcRect/>
+          <a:stretch>
+            <a:fillRect/>
+          </a:stretch>
+        </p:blipFill>
+        <p:spPr bwMode="auto">
+          <a:xfrm>
+            <a:off x="1252538" y="2481263"/>
+            <a:ext cx="6638925" cy="1895475"/>
+          </a:xfrm>
+          <a:prstGeom prst="rect">
+            <a:avLst/>
+          </a:prstGeom>
+          <a:noFill/>
+          <a:ln>
+            <a:noFill/>
+          </a:ln>
+          <a:extLst>
+            <a:ext uri="{909E8E84-426E-40DD-AFC4-6F175D3DCCD1}">
+              <a14:hiddenFill xmlns:a14="http://schemas.microsoft.com/office/drawing/2010/main">
+                <a:solidFill>
+                  <a:schemeClr val="accent1"/>
+                </a:solidFill>
+              </a14:hiddenFill>
+            </a:ext>
+            <a:ext uri="{91240B29-F687-4F45-9708-019B960494DF}">
+              <a14:hiddenLine xmlns:a14="http://schemas.microsoft.com/office/drawing/2010/main" w="9525">
+                <a:solidFill>
+                  <a:schemeClr val="tx1"/>
+                </a:solidFill>
+                <a:miter lim="800000"/>
+                <a:headEnd/>
+                <a:tailEnd/>
+              </a14:hiddenLine>
+            </a:ext>
+          </a:extLst>
+        </p:spPr>
+      </p:pic>
+    </p:spTree>
+    <p:extLst>
+      <p:ext uri="{BB962C8B-B14F-4D97-AF65-F5344CB8AC3E}">
+        <p14:creationId xmlns:p14="http://schemas.microsoft.com/office/powerpoint/2010/main" val="2782388037"/>
+      </p:ext>
+    </p:extLst>
+  </p:cSld>
+  <p:clrMapOvr>
+    <a:masterClrMapping/>
+  </p:clrMapOvr>
+  <p:timing>
+    <p:tnLst>
+      <p:par>
+        <p:cTn id="1" dur="indefinite" restart="never" nodeType="tmRoot"/>
+      </p:par>
+    </p:tnLst>
+  </p:timing>
+</p:sld>
+</file>
+
+<file path=ppt/slides/slide5.xml><?xml version="1.0" encoding="utf-8"?>
+<p:sld xmlns:a="http://schemas.openxmlformats.org/drawingml/2006/main" xmlns:r="http://schemas.openxmlformats.org/officeDocument/2006/relationships" xmlns:p="http://schemas.openxmlformats.org/presentationml/2006/main">
+  <p:cSld>
+    <p:spTree>
+      <p:nvGrpSpPr>
+        <p:cNvPr id="1" name=""/>
+        <p:cNvGrpSpPr/>
+        <p:nvPr/>
+      </p:nvGrpSpPr>
+      <p:grpSpPr>
+        <a:xfrm>
+          <a:off x="0" y="0"/>
+          <a:ext cx="0" cy="0"/>
+          <a:chOff x="0" y="0"/>
+          <a:chExt cx="0" cy="0"/>
+        </a:xfrm>
+      </p:grpSpPr>
+      <p:sp>
+        <p:nvSpPr>
+          <p:cNvPr id="2" name="Title 1"/>
+          <p:cNvSpPr>
+            <a:spLocks noGrp="1"/>
+          </p:cNvSpPr>
+          <p:nvPr>
+            <p:ph type="title"/>
+          </p:nvPr>
+        </p:nvSpPr>
+        <p:spPr/>
+        <p:txBody>
+          <a:bodyPr/>
+          <a:lstStyle/>
+          <a:p>
+            <a:r>
+              <a:rPr lang="da-DK" dirty="0" err="1" smtClean="0"/>
+              <a:t>Related</a:t>
+            </a:r>
+            <a:r>
+              <a:rPr lang="da-DK" dirty="0" smtClean="0"/>
+              <a:t> </a:t>
+            </a:r>
+            <a:r>
+              <a:rPr lang="da-DK" dirty="0" err="1" smtClean="0"/>
+              <a:t>commits</a:t>
+            </a:r>
+            <a:endParaRPr lang="da-DK" dirty="0"/>
+          </a:p>
+        </p:txBody>
+      </p:sp>
+      <p:pic>
+        <p:nvPicPr>
+          <p:cNvPr id="5122" name="Picture 2"/>
+          <p:cNvPicPr>
+            <a:picLocks noChangeAspect="1" noChangeArrowheads="1"/>
+          </p:cNvPicPr>
+          <p:nvPr/>
+        </p:nvPicPr>
+        <p:blipFill>
+          <a:blip r:embed="rId2">
+            <a:extLst>
+              <a:ext uri="{28A0092B-C50C-407E-A947-70E740481C1C}">
+                <a14:useLocalDpi xmlns:a14="http://schemas.microsoft.com/office/drawing/2010/main" val="0"/>
+              </a:ext>
+            </a:extLst>
+          </a:blip>
+          <a:srcRect/>
+          <a:stretch>
+            <a:fillRect/>
+          </a:stretch>
+        </p:blipFill>
+        <p:spPr bwMode="auto">
+          <a:xfrm>
+            <a:off x="1252538" y="2481263"/>
+            <a:ext cx="6638925" cy="1895475"/>
+          </a:xfrm>
+          <a:prstGeom prst="rect">
+            <a:avLst/>
+          </a:prstGeom>
+          <a:noFill/>
+          <a:ln>
+            <a:noFill/>
+          </a:ln>
+          <a:extLst>
+            <a:ext uri="{909E8E84-426E-40DD-AFC4-6F175D3DCCD1}">
+              <a14:hiddenFill xmlns:a14="http://schemas.microsoft.com/office/drawing/2010/main">
+                <a:solidFill>
+                  <a:schemeClr val="accent1"/>
+                </a:solidFill>
+              </a14:hiddenFill>
+            </a:ext>
+            <a:ext uri="{91240B29-F687-4F45-9708-019B960494DF}">
+              <a14:hiddenLine xmlns:a14="http://schemas.microsoft.com/office/drawing/2010/main" w="9525">
+                <a:solidFill>
+                  <a:schemeClr val="tx1"/>
+                </a:solidFill>
+                <a:miter lim="800000"/>
+                <a:headEnd/>
+                <a:tailEnd/>
+              </a14:hiddenLine>
+            </a:ext>
+          </a:extLst>
+        </p:spPr>
+      </p:pic>
+    </p:spTree>
+    <p:extLst>
+      <p:ext uri="{BB962C8B-B14F-4D97-AF65-F5344CB8AC3E}">
+        <p14:creationId xmlns:p14="http://schemas.microsoft.com/office/powerpoint/2010/main" val="3803593049"/>
+      </p:ext>
+    </p:extLst>
+  </p:cSld>
+  <p:clrMapOvr>
+    <a:masterClrMapping/>
+  </p:clrMapOvr>
+  <p:timing>
+    <p:tnLst>
+      <p:par>
+        <p:cTn id="1" dur="indefinite" restart="never" nodeType="tmRoot"/>
+      </p:par>
+    </p:tnLst>
+  </p:timing>
+</p:sld>
+</file>
+
+<file path=ppt/slides/slide6.xml><?xml version="1.0" encoding="utf-8"?>
+<p:sld xmlns:a="http://schemas.openxmlformats.org/drawingml/2006/main" xmlns:r="http://schemas.openxmlformats.org/officeDocument/2006/relationships" xmlns:p="http://schemas.openxmlformats.org/presentationml/2006/main">
+  <p:cSld>
+    <p:spTree>
+      <p:nvGrpSpPr>
+        <p:cNvPr id="1" name=""/>
+        <p:cNvGrpSpPr/>
+        <p:nvPr/>
+      </p:nvGrpSpPr>
+      <p:grpSpPr>
+        <a:xfrm>
+          <a:off x="0" y="0"/>
+          <a:ext cx="0" cy="0"/>
+          <a:chOff x="0" y="0"/>
+          <a:chExt cx="0" cy="0"/>
+        </a:xfrm>
+      </p:grpSpPr>
+      <p:sp>
+        <p:nvSpPr>
+          <p:cNvPr id="2" name="Title 1"/>
+          <p:cNvSpPr>
+            <a:spLocks noGrp="1"/>
+          </p:cNvSpPr>
+          <p:nvPr>
+            <p:ph type="title"/>
+          </p:nvPr>
+        </p:nvSpPr>
+        <p:spPr>
+          <a:xfrm>
+            <a:off x="467544" y="2420888"/>
+            <a:ext cx="8229600" cy="1143000"/>
+          </a:xfrm>
+        </p:spPr>
+        <p:txBody>
+          <a:bodyPr>
+            <a:normAutofit fontScale="90000"/>
+          </a:bodyPr>
+          <a:lstStyle/>
+          <a:p>
+            <a:r>
+              <a:rPr lang="da-DK" dirty="0" smtClean="0"/>
+              <a:t>GIT as an </a:t>
+            </a:r>
+            <a:r>
+              <a:rPr lang="da-DK" dirty="0" err="1" smtClean="0"/>
+              <a:t>editing</a:t>
+            </a:r>
+            <a:r>
+              <a:rPr lang="da-DK" dirty="0" smtClean="0"/>
+              <a:t> </a:t>
+            </a:r>
+            <a:r>
+              <a:rPr lang="da-DK" dirty="0" err="1" smtClean="0"/>
+              <a:t>tool</a:t>
+            </a:r>
+            <a:r>
+              <a:rPr lang="da-DK" dirty="0" smtClean="0"/>
+              <a:t/>
+            </a:r>
+            <a:br>
+              <a:rPr lang="da-DK" dirty="0" smtClean="0"/>
+            </a:br>
+            <a:r>
+              <a:rPr lang="da-DK" dirty="0" smtClean="0"/>
+              <a:t>with manipulation of single </a:t>
+            </a:r>
+            <a:r>
+              <a:rPr lang="da-DK" dirty="0" err="1" smtClean="0"/>
+              <a:t>commits</a:t>
+            </a:r>
+            <a:endParaRPr lang="da-DK" dirty="0"/>
+          </a:p>
+        </p:txBody>
+      </p:sp>
+    </p:spTree>
+    <p:extLst>
+      <p:ext uri="{BB962C8B-B14F-4D97-AF65-F5344CB8AC3E}">
+        <p14:creationId xmlns:p14="http://schemas.microsoft.com/office/powerpoint/2010/main" val="3275652293"/>
+      </p:ext>
+    </p:extLst>
+  </p:cSld>
+  <p:clrMapOvr>
+    <a:masterClrMapping/>
+  </p:clrMapOvr>
+  <p:timing>
+    <p:tnLst>
+      <p:par>
+        <p:cTn id="1" dur="indefinite" restart="never" nodeType="tmRoot"/>
+      </p:par>
+    </p:tnLst>
+  </p:timing>
+</p:sld>
+</file>
+
+<file path=ppt/slides/slide7.xml><?xml version="1.0" encoding="utf-8"?>
+<p:sld xmlns:a="http://schemas.openxmlformats.org/drawingml/2006/main" xmlns:r="http://schemas.openxmlformats.org/officeDocument/2006/relationships" xmlns:p="http://schemas.openxmlformats.org/presentationml/2006/main">
+  <p:cSld>
+    <p:spTree>
+      <p:nvGrpSpPr>
+        <p:cNvPr id="1" name=""/>
+        <p:cNvGrpSpPr/>
+        <p:nvPr/>
+      </p:nvGrpSpPr>
+      <p:grpSpPr>
+        <a:xfrm>
+          <a:off x="0" y="0"/>
+          <a:ext cx="0" cy="0"/>
+          <a:chOff x="0" y="0"/>
+          <a:chExt cx="0" cy="0"/>
+        </a:xfrm>
+      </p:grpSpPr>
+      <p:sp>
+        <p:nvSpPr>
+          <p:cNvPr id="2" name="Title 1"/>
+          <p:cNvSpPr>
+            <a:spLocks noGrp="1"/>
+          </p:cNvSpPr>
+          <p:nvPr>
+            <p:ph type="title"/>
+          </p:nvPr>
+        </p:nvSpPr>
+        <p:spPr/>
+        <p:txBody>
+          <a:bodyPr/>
+          <a:lstStyle/>
+          <a:p>
+            <a:r>
+              <a:rPr lang="da-DK" dirty="0" err="1" smtClean="0"/>
+              <a:t>Error</a:t>
+            </a:r>
+            <a:r>
+              <a:rPr lang="da-DK" dirty="0" smtClean="0"/>
+              <a:t> in last </a:t>
+            </a:r>
+            <a:r>
+              <a:rPr lang="da-DK" dirty="0" err="1" smtClean="0"/>
+              <a:t>commit</a:t>
+            </a:r>
+            <a:endParaRPr lang="da-DK" dirty="0"/>
+          </a:p>
+        </p:txBody>
+      </p:sp>
+      <p:pic>
+        <p:nvPicPr>
+          <p:cNvPr id="6148" name="Picture 4"/>
+          <p:cNvPicPr>
+            <a:picLocks noChangeAspect="1" noChangeArrowheads="1"/>
+          </p:cNvPicPr>
+          <p:nvPr/>
+        </p:nvPicPr>
+        <p:blipFill>
+          <a:blip r:embed="rId2">
+            <a:extLst>
+              <a:ext uri="{28A0092B-C50C-407E-A947-70E740481C1C}">
+                <a14:useLocalDpi xmlns:a14="http://schemas.microsoft.com/office/drawing/2010/main" val="0"/>
+              </a:ext>
+            </a:extLst>
+          </a:blip>
+          <a:srcRect/>
+          <a:stretch>
+            <a:fillRect/>
+          </a:stretch>
+        </p:blipFill>
+        <p:spPr bwMode="auto">
+          <a:xfrm>
+            <a:off x="1238250" y="2947988"/>
+            <a:ext cx="6667500" cy="962025"/>
+          </a:xfrm>
+          <a:prstGeom prst="rect">
+            <a:avLst/>
+          </a:prstGeom>
+          <a:noFill/>
+          <a:ln>
+            <a:noFill/>
+          </a:ln>
+          <a:extLst>
+            <a:ext uri="{909E8E84-426E-40DD-AFC4-6F175D3DCCD1}">
+              <a14:hiddenFill xmlns:a14="http://schemas.microsoft.com/office/drawing/2010/main">
+                <a:solidFill>
+                  <a:schemeClr val="accent1"/>
+                </a:solidFill>
+              </a14:hiddenFill>
+            </a:ext>
+            <a:ext uri="{91240B29-F687-4F45-9708-019B960494DF}">
+              <a14:hiddenLine xmlns:a14="http://schemas.microsoft.com/office/drawing/2010/main" w="9525">
+                <a:solidFill>
+                  <a:schemeClr val="tx1"/>
+                </a:solidFill>
+                <a:miter lim="800000"/>
+                <a:headEnd/>
+                <a:tailEnd/>
+              </a14:hiddenLine>
+            </a:ext>
+          </a:extLst>
+        </p:spPr>
+      </p:pic>
+    </p:spTree>
+    <p:extLst>
+      <p:ext uri="{BB962C8B-B14F-4D97-AF65-F5344CB8AC3E}">
+        <p14:creationId xmlns:p14="http://schemas.microsoft.com/office/powerpoint/2010/main" val="2901999367"/>
+      </p:ext>
+    </p:extLst>
+  </p:cSld>
+  <p:clrMapOvr>
+    <a:masterClrMapping/>
+  </p:clrMapOvr>
+</p:sld>
+</file>
+
+<file path=ppt/slides/slide8.xml><?xml version="1.0" encoding="utf-8"?>
+<p:sld xmlns:a="http://schemas.openxmlformats.org/drawingml/2006/main" xmlns:r="http://schemas.openxmlformats.org/officeDocument/2006/relationships" xmlns:p="http://schemas.openxmlformats.org/presentationml/2006/main">
+  <p:cSld>
+    <p:spTree>
+      <p:nvGrpSpPr>
+        <p:cNvPr id="1" name=""/>
+        <p:cNvGrpSpPr/>
+        <p:nvPr/>
+      </p:nvGrpSpPr>
+      <p:grpSpPr>
+        <a:xfrm>
+          <a:off x="0" y="0"/>
+          <a:ext cx="0" cy="0"/>
+          <a:chOff x="0" y="0"/>
+          <a:chExt cx="0" cy="0"/>
+        </a:xfrm>
+      </p:grpSpPr>
+      <p:sp>
+        <p:nvSpPr>
+          <p:cNvPr id="2" name="Title 1"/>
+          <p:cNvSpPr>
+            <a:spLocks noGrp="1"/>
+          </p:cNvSpPr>
+          <p:nvPr>
+            <p:ph type="title"/>
+          </p:nvPr>
+        </p:nvSpPr>
+        <p:spPr/>
+        <p:txBody>
+          <a:bodyPr/>
+          <a:lstStyle/>
+          <a:p>
+            <a:r>
+              <a:rPr lang="da-DK" dirty="0" err="1" smtClean="0"/>
+              <a:t>Fixing</a:t>
+            </a:r>
+            <a:r>
+              <a:rPr lang="da-DK" dirty="0" smtClean="0"/>
+              <a:t> an </a:t>
+            </a:r>
+            <a:r>
+              <a:rPr lang="da-DK" dirty="0" err="1" smtClean="0"/>
+              <a:t>error</a:t>
+            </a:r>
+            <a:r>
+              <a:rPr lang="da-DK" dirty="0" smtClean="0"/>
+              <a:t> in last </a:t>
+            </a:r>
+            <a:r>
+              <a:rPr lang="da-DK" dirty="0" err="1" smtClean="0"/>
+              <a:t>commit</a:t>
+            </a:r>
+            <a:endParaRPr lang="da-DK" dirty="0"/>
+          </a:p>
+        </p:txBody>
+      </p:sp>
+    </p:spTree>
+    <p:extLst>
+      <p:ext uri="{BB962C8B-B14F-4D97-AF65-F5344CB8AC3E}">
+        <p14:creationId xmlns:p14="http://schemas.microsoft.com/office/powerpoint/2010/main" val="1047603216"/>
+      </p:ext>
+    </p:extLst>
+  </p:cSld>
+  <p:clrMapOvr>
+    <a:masterClrMapping/>
+  </p:clrMapOvr>
+</p:sld>
+</file>
+
+<file path=ppt/slides/slide9.xml><?xml version="1.0" encoding="utf-8"?>
 <p:sld xmlns:a="http://schemas.openxmlformats.org/drawingml/2006/main" xmlns:r="http://schemas.openxmlformats.org/officeDocument/2006/relationships" xmlns:p="http://schemas.openxmlformats.org/presentationml/2006/main">
   <p:cSld>
     <p:spTree>
@@ -3441,135 +4218,13 @@
   <p:clrMapOvr>
     <a:masterClrMapping/>
   </p:clrMapOvr>
-</p:sld>
-</file>
-
-<file path=ppt/slides/slide4.xml><?xml version="1.0" encoding="utf-8"?>
-<p:sld xmlns:a="http://schemas.openxmlformats.org/drawingml/2006/main" xmlns:r="http://schemas.openxmlformats.org/officeDocument/2006/relationships" xmlns:p="http://schemas.openxmlformats.org/presentationml/2006/main">
-  <p:cSld>
-    <p:spTree>
-      <p:nvGrpSpPr>
-        <p:cNvPr id="1" name=""/>
-        <p:cNvGrpSpPr/>
-        <p:nvPr/>
-      </p:nvGrpSpPr>
-      <p:grpSpPr>
-        <a:xfrm>
-          <a:off x="0" y="0"/>
-          <a:ext cx="0" cy="0"/>
-          <a:chOff x="0" y="0"/>
-          <a:chExt cx="0" cy="0"/>
-        </a:xfrm>
-      </p:grpSpPr>
-      <p:sp>
-        <p:nvSpPr>
-          <p:cNvPr id="2" name="Title 1"/>
-          <p:cNvSpPr>
-            <a:spLocks noGrp="1"/>
-          </p:cNvSpPr>
-          <p:nvPr>
-            <p:ph type="title"/>
-          </p:nvPr>
-        </p:nvSpPr>
-        <p:spPr/>
-        <p:txBody>
-          <a:bodyPr>
-            <a:normAutofit/>
-          </a:bodyPr>
-          <a:lstStyle/>
-          <a:p>
-            <a:r>
-              <a:rPr lang="da-DK" dirty="0" err="1" smtClean="0"/>
-              <a:t>Two</a:t>
-            </a:r>
-            <a:r>
-              <a:rPr lang="da-DK" dirty="0" smtClean="0"/>
-              <a:t> persons </a:t>
-            </a:r>
-            <a:r>
-              <a:rPr lang="da-DK" dirty="0" err="1" smtClean="0"/>
-              <a:t>work</a:t>
-            </a:r>
-            <a:r>
-              <a:rPr lang="da-DK" dirty="0" smtClean="0"/>
-              <a:t> on </a:t>
-            </a:r>
-            <a:r>
-              <a:rPr lang="da-DK" dirty="0" err="1" smtClean="0"/>
-              <a:t>two</a:t>
-            </a:r>
-            <a:r>
-              <a:rPr lang="da-DK" dirty="0" smtClean="0"/>
-              <a:t> branches</a:t>
-            </a:r>
-            <a:endParaRPr lang="da-DK" dirty="0"/>
-          </a:p>
-        </p:txBody>
-      </p:sp>
-      <p:pic>
-        <p:nvPicPr>
-          <p:cNvPr id="4098" name="Picture 2"/>
-          <p:cNvPicPr>
-            <a:picLocks noChangeAspect="1" noChangeArrowheads="1"/>
-          </p:cNvPicPr>
-          <p:nvPr/>
-        </p:nvPicPr>
-        <p:blipFill>
-          <a:blip r:embed="rId2">
-            <a:extLst>
-              <a:ext uri="{28A0092B-C50C-407E-A947-70E740481C1C}">
-                <a14:useLocalDpi xmlns:a14="http://schemas.microsoft.com/office/drawing/2010/main" val="0"/>
-              </a:ext>
-            </a:extLst>
-          </a:blip>
-          <a:srcRect/>
-          <a:stretch>
-            <a:fillRect/>
-          </a:stretch>
-        </p:blipFill>
-        <p:spPr bwMode="auto">
-          <a:xfrm>
-            <a:off x="1252538" y="2481263"/>
-            <a:ext cx="6638925" cy="1895475"/>
-          </a:xfrm>
-          <a:prstGeom prst="rect">
-            <a:avLst/>
-          </a:prstGeom>
-          <a:noFill/>
-          <a:ln>
-            <a:noFill/>
-          </a:ln>
-          <a:extLst>
-            <a:ext uri="{909E8E84-426E-40DD-AFC4-6F175D3DCCD1}">
-              <a14:hiddenFill xmlns:a14="http://schemas.microsoft.com/office/drawing/2010/main">
-                <a:solidFill>
-                  <a:schemeClr val="accent1"/>
-                </a:solidFill>
-              </a14:hiddenFill>
-            </a:ext>
-            <a:ext uri="{91240B29-F687-4F45-9708-019B960494DF}">
-              <a14:hiddenLine xmlns:a14="http://schemas.microsoft.com/office/drawing/2010/main" w="9525">
-                <a:solidFill>
-                  <a:schemeClr val="tx1"/>
-                </a:solidFill>
-                <a:miter lim="800000"/>
-                <a:headEnd/>
-                <a:tailEnd/>
-              </a14:hiddenLine>
-            </a:ext>
-          </a:extLst>
-        </p:spPr>
-      </p:pic>
-    </p:spTree>
-    <p:extLst>
-      <p:ext uri="{BB962C8B-B14F-4D97-AF65-F5344CB8AC3E}">
-        <p14:creationId xmlns:p14="http://schemas.microsoft.com/office/powerpoint/2010/main" val="2782388037"/>
-      </p:ext>
-    </p:extLst>
-  </p:cSld>
-  <p:clrMapOvr>
-    <a:masterClrMapping/>
-  </p:clrMapOvr>
+  <p:timing>
+    <p:tnLst>
+      <p:par>
+        <p:cTn id="1" dur="indefinite" restart="never" nodeType="tmRoot"/>
+      </p:par>
+    </p:tnLst>
+  </p:timing>
 </p:sld>
 </file>
 

</xml_diff>

<commit_message>
Add more git rebase scenarios.
</commit_message>
<xml_diff>
--- a/GitRebase.pptx
+++ b/GitRebase.pptx
@@ -20,6 +20,15 @@
     <p:sldId id="271" r:id="rId14"/>
     <p:sldId id="259" r:id="rId15"/>
     <p:sldId id="264" r:id="rId16"/>
+    <p:sldId id="272" r:id="rId17"/>
+    <p:sldId id="273" r:id="rId18"/>
+    <p:sldId id="274" r:id="rId19"/>
+    <p:sldId id="275" r:id="rId20"/>
+    <p:sldId id="276" r:id="rId21"/>
+    <p:sldId id="277" r:id="rId22"/>
+    <p:sldId id="278" r:id="rId23"/>
+    <p:sldId id="279" r:id="rId24"/>
+    <p:sldId id="280" r:id="rId25"/>
   </p:sldIdLst>
   <p:sldSz cx="9144000" cy="6858000" type="screen4x3"/>
   <p:notesSz cx="6858000" cy="9144000"/>
@@ -3313,6 +3322,13 @@
   <p:clrMapOvr>
     <a:masterClrMapping/>
   </p:clrMapOvr>
+  <p:timing>
+    <p:tnLst>
+      <p:par>
+        <p:cTn id="1" dur="indefinite" restart="never" nodeType="tmRoot"/>
+      </p:par>
+    </p:tnLst>
+  </p:timing>
 </p:sld>
 </file>
 
@@ -3428,6 +3444,13 @@
   <p:clrMapOvr>
     <a:masterClrMapping/>
   </p:clrMapOvr>
+  <p:timing>
+    <p:tnLst>
+      <p:par>
+        <p:cTn id="1" dur="indefinite" restart="never" nodeType="tmRoot"/>
+      </p:par>
+    </p:tnLst>
+  </p:timing>
 </p:sld>
 </file>
 
@@ -3535,6 +3558,13 @@
   <p:clrMapOvr>
     <a:masterClrMapping/>
   </p:clrMapOvr>
+  <p:timing>
+    <p:tnLst>
+      <p:par>
+        <p:cTn id="1" dur="indefinite" restart="never" nodeType="tmRoot"/>
+      </p:par>
+    </p:tnLst>
+  </p:timing>
 </p:sld>
 </file>
 
@@ -3650,6 +3680,13 @@
   <p:clrMapOvr>
     <a:masterClrMapping/>
   </p:clrMapOvr>
+  <p:timing>
+    <p:tnLst>
+      <p:par>
+        <p:cTn id="1" dur="indefinite" restart="never" nodeType="tmRoot"/>
+      </p:par>
+    </p:tnLst>
+  </p:timing>
 </p:sld>
 </file>
 
@@ -3682,12 +3719,45 @@
         </p:nvSpPr>
         <p:spPr/>
         <p:txBody>
-          <a:bodyPr/>
-          <a:lstStyle/>
-          <a:p>
-            <a:r>
-              <a:rPr lang="da-DK" smtClean="0"/>
-              <a:t>Linear </a:t>
+          <a:bodyPr>
+            <a:normAutofit fontScale="90000"/>
+          </a:bodyPr>
+          <a:lstStyle/>
+          <a:p>
+            <a:r>
+              <a:rPr lang="da-DK" dirty="0" smtClean="0"/>
+              <a:t>One </a:t>
+            </a:r>
+            <a:r>
+              <a:rPr lang="da-DK" dirty="0" err="1" smtClean="0"/>
+              <a:t>branch</a:t>
+            </a:r>
+            <a:r>
+              <a:rPr lang="da-DK" dirty="0" smtClean="0"/>
+              <a:t> with </a:t>
+            </a:r>
+            <a:r>
+              <a:rPr lang="da-DK" dirty="0" err="1" smtClean="0"/>
+              <a:t>pull</a:t>
+            </a:r>
+            <a:r>
+              <a:rPr lang="da-DK" dirty="0" smtClean="0"/>
+              <a:t> --</a:t>
+            </a:r>
+            <a:r>
+              <a:rPr lang="da-DK" dirty="0" err="1" smtClean="0"/>
+              <a:t>rebase</a:t>
+            </a:r>
+            <a:r>
+              <a:rPr lang="da-DK" dirty="0" smtClean="0"/>
+              <a:t/>
+            </a:r>
+            <a:br>
+              <a:rPr lang="da-DK" dirty="0" smtClean="0"/>
+            </a:br>
+            <a:r>
+              <a:rPr lang="da-DK" dirty="0" smtClean="0"/>
+              <a:t>= Linear </a:t>
             </a:r>
             <a:r>
               <a:rPr lang="da-DK" dirty="0" err="1" smtClean="0"/>
@@ -3720,7 +3790,7 @@
         </p:blipFill>
         <p:spPr bwMode="auto">
           <a:xfrm>
-            <a:off x="1704975" y="1862138"/>
+            <a:off x="1716967" y="2204864"/>
             <a:ext cx="5734050" cy="3133725"/>
           </a:xfrm>
           <a:prstGeom prst="rect">
@@ -3880,6 +3950,494 @@
     <p:extLst>
       <p:ext uri="{BB962C8B-B14F-4D97-AF65-F5344CB8AC3E}">
         <p14:creationId xmlns:p14="http://schemas.microsoft.com/office/powerpoint/2010/main" val="3406085868"/>
+      </p:ext>
+    </p:extLst>
+  </p:cSld>
+  <p:clrMapOvr>
+    <a:masterClrMapping/>
+  </p:clrMapOvr>
+  <p:timing>
+    <p:tnLst>
+      <p:par>
+        <p:cTn id="1" dur="indefinite" restart="never" nodeType="tmRoot"/>
+      </p:par>
+    </p:tnLst>
+  </p:timing>
+</p:sld>
+</file>
+
+<file path=ppt/slides/slide16.xml><?xml version="1.0" encoding="utf-8"?>
+<p:sld xmlns:a="http://schemas.openxmlformats.org/drawingml/2006/main" xmlns:r="http://schemas.openxmlformats.org/officeDocument/2006/relationships" xmlns:p="http://schemas.openxmlformats.org/presentationml/2006/main">
+  <p:cSld>
+    <p:spTree>
+      <p:nvGrpSpPr>
+        <p:cNvPr id="1" name=""/>
+        <p:cNvGrpSpPr/>
+        <p:nvPr/>
+      </p:nvGrpSpPr>
+      <p:grpSpPr>
+        <a:xfrm>
+          <a:off x="0" y="0"/>
+          <a:ext cx="0" cy="0"/>
+          <a:chOff x="0" y="0"/>
+          <a:chExt cx="0" cy="0"/>
+        </a:xfrm>
+      </p:grpSpPr>
+      <p:sp>
+        <p:nvSpPr>
+          <p:cNvPr id="2" name="Title 1"/>
+          <p:cNvSpPr>
+            <a:spLocks noGrp="1"/>
+          </p:cNvSpPr>
+          <p:nvPr>
+            <p:ph type="title"/>
+          </p:nvPr>
+        </p:nvSpPr>
+        <p:spPr/>
+        <p:txBody>
+          <a:bodyPr/>
+          <a:lstStyle/>
+          <a:p>
+            <a:r>
+              <a:rPr lang="da-DK" dirty="0" smtClean="0"/>
+              <a:t>A </a:t>
+            </a:r>
+            <a:r>
+              <a:rPr lang="da-DK" dirty="0" err="1" smtClean="0"/>
+              <a:t>nice</a:t>
+            </a:r>
+            <a:r>
+              <a:rPr lang="da-DK" dirty="0" smtClean="0"/>
+              <a:t> </a:t>
+            </a:r>
+            <a:r>
+              <a:rPr lang="da-DK" dirty="0" err="1" smtClean="0"/>
+              <a:t>mix</a:t>
+            </a:r>
+            <a:r>
+              <a:rPr lang="da-DK" dirty="0" smtClean="0"/>
+              <a:t> of </a:t>
+            </a:r>
+            <a:r>
+              <a:rPr lang="da-DK" dirty="0" err="1" smtClean="0"/>
+              <a:t>changes</a:t>
+            </a:r>
+            <a:endParaRPr lang="da-DK" dirty="0"/>
+          </a:p>
+        </p:txBody>
+      </p:sp>
+      <p:pic>
+        <p:nvPicPr>
+          <p:cNvPr id="12293" name="Picture 5"/>
+          <p:cNvPicPr>
+            <a:picLocks noChangeAspect="1" noChangeArrowheads="1"/>
+          </p:cNvPicPr>
+          <p:nvPr/>
+        </p:nvPicPr>
+        <p:blipFill>
+          <a:blip r:embed="rId2">
+            <a:extLst>
+              <a:ext uri="{28A0092B-C50C-407E-A947-70E740481C1C}">
+                <a14:useLocalDpi xmlns:a14="http://schemas.microsoft.com/office/drawing/2010/main" val="0"/>
+              </a:ext>
+            </a:extLst>
+          </a:blip>
+          <a:srcRect/>
+          <a:stretch>
+            <a:fillRect/>
+          </a:stretch>
+        </p:blipFill>
+        <p:spPr bwMode="auto">
+          <a:xfrm>
+            <a:off x="1571625" y="2105025"/>
+            <a:ext cx="6000750" cy="2647950"/>
+          </a:xfrm>
+          <a:prstGeom prst="rect">
+            <a:avLst/>
+          </a:prstGeom>
+          <a:noFill/>
+          <a:ln>
+            <a:noFill/>
+          </a:ln>
+          <a:extLst>
+            <a:ext uri="{909E8E84-426E-40DD-AFC4-6F175D3DCCD1}">
+              <a14:hiddenFill xmlns:a14="http://schemas.microsoft.com/office/drawing/2010/main">
+                <a:solidFill>
+                  <a:schemeClr val="accent1"/>
+                </a:solidFill>
+              </a14:hiddenFill>
+            </a:ext>
+            <a:ext uri="{91240B29-F687-4F45-9708-019B960494DF}">
+              <a14:hiddenLine xmlns:a14="http://schemas.microsoft.com/office/drawing/2010/main" w="9525">
+                <a:solidFill>
+                  <a:schemeClr val="tx1"/>
+                </a:solidFill>
+                <a:miter lim="800000"/>
+                <a:headEnd/>
+                <a:tailEnd/>
+              </a14:hiddenLine>
+            </a:ext>
+          </a:extLst>
+        </p:spPr>
+      </p:pic>
+    </p:spTree>
+    <p:extLst>
+      <p:ext uri="{BB962C8B-B14F-4D97-AF65-F5344CB8AC3E}">
+        <p14:creationId xmlns:p14="http://schemas.microsoft.com/office/powerpoint/2010/main" val="3640268507"/>
+      </p:ext>
+    </p:extLst>
+  </p:cSld>
+  <p:clrMapOvr>
+    <a:masterClrMapping/>
+  </p:clrMapOvr>
+  <p:timing>
+    <p:tnLst>
+      <p:par>
+        <p:cTn id="1" dur="indefinite" restart="never" nodeType="tmRoot"/>
+      </p:par>
+    </p:tnLst>
+  </p:timing>
+</p:sld>
+</file>
+
+<file path=ppt/slides/slide17.xml><?xml version="1.0" encoding="utf-8"?>
+<p:sld xmlns:a="http://schemas.openxmlformats.org/drawingml/2006/main" xmlns:r="http://schemas.openxmlformats.org/officeDocument/2006/relationships" xmlns:p="http://schemas.openxmlformats.org/presentationml/2006/main">
+  <p:cSld>
+    <p:spTree>
+      <p:nvGrpSpPr>
+        <p:cNvPr id="1" name=""/>
+        <p:cNvGrpSpPr/>
+        <p:nvPr/>
+      </p:nvGrpSpPr>
+      <p:grpSpPr>
+        <a:xfrm>
+          <a:off x="0" y="0"/>
+          <a:ext cx="0" cy="0"/>
+          <a:chOff x="0" y="0"/>
+          <a:chExt cx="0" cy="0"/>
+        </a:xfrm>
+      </p:grpSpPr>
+      <p:sp>
+        <p:nvSpPr>
+          <p:cNvPr id="2" name="Title 1"/>
+          <p:cNvSpPr>
+            <a:spLocks noGrp="1"/>
+          </p:cNvSpPr>
+          <p:nvPr>
+            <p:ph type="title"/>
+          </p:nvPr>
+        </p:nvSpPr>
+        <p:spPr/>
+        <p:txBody>
+          <a:bodyPr/>
+          <a:lstStyle/>
+          <a:p>
+            <a:r>
+              <a:rPr lang="da-DK" dirty="0" err="1" smtClean="0"/>
+              <a:t>Reword</a:t>
+            </a:r>
+            <a:endParaRPr lang="da-DK" dirty="0"/>
+          </a:p>
+        </p:txBody>
+      </p:sp>
+      <p:pic>
+        <p:nvPicPr>
+          <p:cNvPr id="13314" name="Picture 2"/>
+          <p:cNvPicPr>
+            <a:picLocks noChangeAspect="1" noChangeArrowheads="1"/>
+          </p:cNvPicPr>
+          <p:nvPr/>
+        </p:nvPicPr>
+        <p:blipFill>
+          <a:blip r:embed="rId2">
+            <a:extLst>
+              <a:ext uri="{28A0092B-C50C-407E-A947-70E740481C1C}">
+                <a14:useLocalDpi xmlns:a14="http://schemas.microsoft.com/office/drawing/2010/main" val="0"/>
+              </a:ext>
+            </a:extLst>
+          </a:blip>
+          <a:srcRect/>
+          <a:stretch>
+            <a:fillRect/>
+          </a:stretch>
+        </p:blipFill>
+        <p:spPr bwMode="auto">
+          <a:xfrm>
+            <a:off x="1533525" y="2009775"/>
+            <a:ext cx="6076950" cy="2838450"/>
+          </a:xfrm>
+          <a:prstGeom prst="rect">
+            <a:avLst/>
+          </a:prstGeom>
+          <a:noFill/>
+          <a:ln>
+            <a:noFill/>
+          </a:ln>
+          <a:extLst>
+            <a:ext uri="{909E8E84-426E-40DD-AFC4-6F175D3DCCD1}">
+              <a14:hiddenFill xmlns:a14="http://schemas.microsoft.com/office/drawing/2010/main">
+                <a:solidFill>
+                  <a:schemeClr val="accent1"/>
+                </a:solidFill>
+              </a14:hiddenFill>
+            </a:ext>
+            <a:ext uri="{91240B29-F687-4F45-9708-019B960494DF}">
+              <a14:hiddenLine xmlns:a14="http://schemas.microsoft.com/office/drawing/2010/main" w="9525">
+                <a:solidFill>
+                  <a:schemeClr val="tx1"/>
+                </a:solidFill>
+                <a:miter lim="800000"/>
+                <a:headEnd/>
+                <a:tailEnd/>
+              </a14:hiddenLine>
+            </a:ext>
+          </a:extLst>
+        </p:spPr>
+      </p:pic>
+    </p:spTree>
+    <p:extLst>
+      <p:ext uri="{BB962C8B-B14F-4D97-AF65-F5344CB8AC3E}">
+        <p14:creationId xmlns:p14="http://schemas.microsoft.com/office/powerpoint/2010/main" val="1599733015"/>
+      </p:ext>
+    </p:extLst>
+  </p:cSld>
+  <p:clrMapOvr>
+    <a:masterClrMapping/>
+  </p:clrMapOvr>
+  <p:timing>
+    <p:tnLst>
+      <p:par>
+        <p:cTn id="1" dur="indefinite" restart="never" nodeType="tmRoot"/>
+      </p:par>
+    </p:tnLst>
+  </p:timing>
+</p:sld>
+</file>
+
+<file path=ppt/slides/slide18.xml><?xml version="1.0" encoding="utf-8"?>
+<p:sld xmlns:a="http://schemas.openxmlformats.org/drawingml/2006/main" xmlns:r="http://schemas.openxmlformats.org/officeDocument/2006/relationships" xmlns:p="http://schemas.openxmlformats.org/presentationml/2006/main">
+  <p:cSld>
+    <p:spTree>
+      <p:nvGrpSpPr>
+        <p:cNvPr id="1" name=""/>
+        <p:cNvGrpSpPr/>
+        <p:nvPr/>
+      </p:nvGrpSpPr>
+      <p:grpSpPr>
+        <a:xfrm>
+          <a:off x="0" y="0"/>
+          <a:ext cx="0" cy="0"/>
+          <a:chOff x="0" y="0"/>
+          <a:chExt cx="0" cy="0"/>
+        </a:xfrm>
+      </p:grpSpPr>
+      <p:sp>
+        <p:nvSpPr>
+          <p:cNvPr id="2" name="Title 1"/>
+          <p:cNvSpPr>
+            <a:spLocks noGrp="1"/>
+          </p:cNvSpPr>
+          <p:nvPr>
+            <p:ph type="title"/>
+          </p:nvPr>
+        </p:nvSpPr>
+        <p:spPr/>
+        <p:txBody>
+          <a:bodyPr/>
+          <a:lstStyle/>
+          <a:p>
+            <a:r>
+              <a:rPr lang="da-DK" dirty="0" smtClean="0"/>
+              <a:t>Squash / fix</a:t>
+            </a:r>
+            <a:endParaRPr lang="da-DK" dirty="0"/>
+          </a:p>
+        </p:txBody>
+      </p:sp>
+      <p:pic>
+        <p:nvPicPr>
+          <p:cNvPr id="14338" name="Picture 2"/>
+          <p:cNvPicPr>
+            <a:picLocks noChangeAspect="1" noChangeArrowheads="1"/>
+          </p:cNvPicPr>
+          <p:nvPr/>
+        </p:nvPicPr>
+        <p:blipFill>
+          <a:blip r:embed="rId2">
+            <a:extLst>
+              <a:ext uri="{28A0092B-C50C-407E-A947-70E740481C1C}">
+                <a14:useLocalDpi xmlns:a14="http://schemas.microsoft.com/office/drawing/2010/main" val="0"/>
+              </a:ext>
+            </a:extLst>
+          </a:blip>
+          <a:srcRect/>
+          <a:stretch>
+            <a:fillRect/>
+          </a:stretch>
+        </p:blipFill>
+        <p:spPr bwMode="auto">
+          <a:xfrm>
+            <a:off x="1557338" y="1933575"/>
+            <a:ext cx="6029325" cy="2990850"/>
+          </a:xfrm>
+          <a:prstGeom prst="rect">
+            <a:avLst/>
+          </a:prstGeom>
+          <a:noFill/>
+          <a:ln>
+            <a:noFill/>
+          </a:ln>
+          <a:extLst>
+            <a:ext uri="{909E8E84-426E-40DD-AFC4-6F175D3DCCD1}">
+              <a14:hiddenFill xmlns:a14="http://schemas.microsoft.com/office/drawing/2010/main">
+                <a:solidFill>
+                  <a:schemeClr val="accent1"/>
+                </a:solidFill>
+              </a14:hiddenFill>
+            </a:ext>
+            <a:ext uri="{91240B29-F687-4F45-9708-019B960494DF}">
+              <a14:hiddenLine xmlns:a14="http://schemas.microsoft.com/office/drawing/2010/main" w="9525">
+                <a:solidFill>
+                  <a:schemeClr val="tx1"/>
+                </a:solidFill>
+                <a:miter lim="800000"/>
+                <a:headEnd/>
+                <a:tailEnd/>
+              </a14:hiddenLine>
+            </a:ext>
+          </a:extLst>
+        </p:spPr>
+      </p:pic>
+    </p:spTree>
+    <p:extLst>
+      <p:ext uri="{BB962C8B-B14F-4D97-AF65-F5344CB8AC3E}">
+        <p14:creationId xmlns:p14="http://schemas.microsoft.com/office/powerpoint/2010/main" val="420560882"/>
+      </p:ext>
+    </p:extLst>
+  </p:cSld>
+  <p:clrMapOvr>
+    <a:masterClrMapping/>
+  </p:clrMapOvr>
+  <p:timing>
+    <p:tnLst>
+      <p:par>
+        <p:cTn id="1" dur="indefinite" restart="never" nodeType="tmRoot"/>
+      </p:par>
+    </p:tnLst>
+  </p:timing>
+</p:sld>
+</file>
+
+<file path=ppt/slides/slide19.xml><?xml version="1.0" encoding="utf-8"?>
+<p:sld xmlns:a="http://schemas.openxmlformats.org/drawingml/2006/main" xmlns:r="http://schemas.openxmlformats.org/officeDocument/2006/relationships" xmlns:p="http://schemas.openxmlformats.org/presentationml/2006/main">
+  <p:cSld>
+    <p:spTree>
+      <p:nvGrpSpPr>
+        <p:cNvPr id="1" name=""/>
+        <p:cNvGrpSpPr/>
+        <p:nvPr/>
+      </p:nvGrpSpPr>
+      <p:grpSpPr>
+        <a:xfrm>
+          <a:off x="0" y="0"/>
+          <a:ext cx="0" cy="0"/>
+          <a:chOff x="0" y="0"/>
+          <a:chExt cx="0" cy="0"/>
+        </a:xfrm>
+      </p:grpSpPr>
+      <p:sp>
+        <p:nvSpPr>
+          <p:cNvPr id="2" name="Title 1"/>
+          <p:cNvSpPr>
+            <a:spLocks noGrp="1"/>
+          </p:cNvSpPr>
+          <p:nvPr>
+            <p:ph type="title"/>
+          </p:nvPr>
+        </p:nvSpPr>
+        <p:spPr/>
+        <p:txBody>
+          <a:bodyPr/>
+          <a:lstStyle/>
+          <a:p>
+            <a:r>
+              <a:rPr lang="da-DK" dirty="0" smtClean="0"/>
+              <a:t>Edit / </a:t>
+            </a:r>
+            <a:r>
+              <a:rPr lang="da-DK" dirty="0" err="1" smtClean="0"/>
+              <a:t>insert</a:t>
+            </a:r>
+            <a:r>
+              <a:rPr lang="da-DK" dirty="0" smtClean="0"/>
+              <a:t> new </a:t>
+            </a:r>
+            <a:r>
+              <a:rPr lang="da-DK" dirty="0" err="1" smtClean="0"/>
+              <a:t>commits</a:t>
+            </a:r>
+            <a:endParaRPr lang="da-DK" dirty="0"/>
+          </a:p>
+        </p:txBody>
+      </p:sp>
+      <p:pic>
+        <p:nvPicPr>
+          <p:cNvPr id="15362" name="Picture 2"/>
+          <p:cNvPicPr>
+            <a:picLocks noChangeAspect="1" noChangeArrowheads="1"/>
+          </p:cNvPicPr>
+          <p:nvPr/>
+        </p:nvPicPr>
+        <p:blipFill>
+          <a:blip r:embed="rId2">
+            <a:extLst>
+              <a:ext uri="{28A0092B-C50C-407E-A947-70E740481C1C}">
+                <a14:useLocalDpi xmlns:a14="http://schemas.microsoft.com/office/drawing/2010/main" val="0"/>
+              </a:ext>
+            </a:extLst>
+          </a:blip>
+          <a:srcRect/>
+          <a:stretch>
+            <a:fillRect/>
+          </a:stretch>
+        </p:blipFill>
+        <p:spPr bwMode="auto">
+          <a:xfrm>
+            <a:off x="1504950" y="2185988"/>
+            <a:ext cx="6134100" cy="2486025"/>
+          </a:xfrm>
+          <a:prstGeom prst="rect">
+            <a:avLst/>
+          </a:prstGeom>
+          <a:noFill/>
+          <a:ln>
+            <a:noFill/>
+          </a:ln>
+          <a:extLst>
+            <a:ext uri="{909E8E84-426E-40DD-AFC4-6F175D3DCCD1}">
+              <a14:hiddenFill xmlns:a14="http://schemas.microsoft.com/office/drawing/2010/main">
+                <a:solidFill>
+                  <a:schemeClr val="accent1"/>
+                </a:solidFill>
+              </a14:hiddenFill>
+            </a:ext>
+            <a:ext uri="{91240B29-F687-4F45-9708-019B960494DF}">
+              <a14:hiddenLine xmlns:a14="http://schemas.microsoft.com/office/drawing/2010/main" w="9525">
+                <a:solidFill>
+                  <a:schemeClr val="tx1"/>
+                </a:solidFill>
+                <a:miter lim="800000"/>
+                <a:headEnd/>
+                <a:tailEnd/>
+              </a14:hiddenLine>
+            </a:ext>
+          </a:extLst>
+        </p:spPr>
+      </p:pic>
+    </p:spTree>
+    <p:extLst>
+      <p:ext uri="{BB962C8B-B14F-4D97-AF65-F5344CB8AC3E}">
+        <p14:creationId xmlns:p14="http://schemas.microsoft.com/office/powerpoint/2010/main" val="2325265513"/>
       </p:ext>
     </p:extLst>
   </p:cSld>
@@ -4025,6 +4583,631 @@
       </p:par>
     </p:tnLst>
   </p:timing>
+</p:sld>
+</file>
+
+<file path=ppt/slides/slide20.xml><?xml version="1.0" encoding="utf-8"?>
+<p:sld xmlns:a="http://schemas.openxmlformats.org/drawingml/2006/main" xmlns:r="http://schemas.openxmlformats.org/officeDocument/2006/relationships" xmlns:p="http://schemas.openxmlformats.org/presentationml/2006/main">
+  <p:cSld>
+    <p:spTree>
+      <p:nvGrpSpPr>
+        <p:cNvPr id="1" name=""/>
+        <p:cNvGrpSpPr/>
+        <p:nvPr/>
+      </p:nvGrpSpPr>
+      <p:grpSpPr>
+        <a:xfrm>
+          <a:off x="0" y="0"/>
+          <a:ext cx="0" cy="0"/>
+          <a:chOff x="0" y="0"/>
+          <a:chExt cx="0" cy="0"/>
+        </a:xfrm>
+      </p:grpSpPr>
+      <p:sp>
+        <p:nvSpPr>
+          <p:cNvPr id="2" name="Title 1"/>
+          <p:cNvSpPr>
+            <a:spLocks noGrp="1"/>
+          </p:cNvSpPr>
+          <p:nvPr>
+            <p:ph type="title"/>
+          </p:nvPr>
+        </p:nvSpPr>
+        <p:spPr/>
+        <p:txBody>
+          <a:bodyPr>
+            <a:normAutofit fontScale="90000"/>
+          </a:bodyPr>
+          <a:lstStyle/>
+          <a:p>
+            <a:r>
+              <a:rPr lang="da-DK" dirty="0" smtClean="0"/>
+              <a:t>Local </a:t>
+            </a:r>
+            <a:r>
+              <a:rPr lang="da-DK" dirty="0" err="1" smtClean="0"/>
+              <a:t>work</a:t>
+            </a:r>
+            <a:r>
+              <a:rPr lang="da-DK" dirty="0" smtClean="0"/>
+              <a:t> </a:t>
+            </a:r>
+            <a:r>
+              <a:rPr lang="da-DK" dirty="0" err="1" smtClean="0"/>
+              <a:t>alternating</a:t>
+            </a:r>
+            <a:r>
+              <a:rPr lang="da-DK" dirty="0" smtClean="0"/>
+              <a:t> with </a:t>
+            </a:r>
+            <a:r>
+              <a:rPr lang="da-DK" dirty="0" err="1" smtClean="0"/>
+              <a:t>merges</a:t>
+            </a:r>
+            <a:r>
+              <a:rPr lang="da-DK" dirty="0" smtClean="0"/>
+              <a:t> of </a:t>
+            </a:r>
+            <a:r>
+              <a:rPr lang="da-DK" dirty="0" err="1" smtClean="0"/>
+              <a:t>changes</a:t>
+            </a:r>
+            <a:r>
+              <a:rPr lang="da-DK" dirty="0" smtClean="0"/>
+              <a:t> from </a:t>
+            </a:r>
+            <a:r>
+              <a:rPr lang="da-DK" dirty="0" err="1" smtClean="0"/>
+              <a:t>other</a:t>
+            </a:r>
+            <a:r>
+              <a:rPr lang="da-DK" dirty="0" smtClean="0"/>
+              <a:t> persons</a:t>
+            </a:r>
+            <a:endParaRPr lang="da-DK" dirty="0"/>
+          </a:p>
+        </p:txBody>
+      </p:sp>
+      <p:pic>
+        <p:nvPicPr>
+          <p:cNvPr id="1026" name="Picture 2"/>
+          <p:cNvPicPr>
+            <a:picLocks noChangeAspect="1" noChangeArrowheads="1"/>
+          </p:cNvPicPr>
+          <p:nvPr/>
+        </p:nvPicPr>
+        <p:blipFill>
+          <a:blip r:embed="rId2">
+            <a:extLst>
+              <a:ext uri="{28A0092B-C50C-407E-A947-70E740481C1C}">
+                <a14:useLocalDpi xmlns:a14="http://schemas.microsoft.com/office/drawing/2010/main" val="0"/>
+              </a:ext>
+            </a:extLst>
+          </a:blip>
+          <a:srcRect/>
+          <a:stretch>
+            <a:fillRect/>
+          </a:stretch>
+        </p:blipFill>
+        <p:spPr bwMode="auto">
+          <a:xfrm>
+            <a:off x="1520925" y="2276872"/>
+            <a:ext cx="6134100" cy="2695575"/>
+          </a:xfrm>
+          <a:prstGeom prst="rect">
+            <a:avLst/>
+          </a:prstGeom>
+          <a:noFill/>
+          <a:ln>
+            <a:noFill/>
+          </a:ln>
+          <a:extLst>
+            <a:ext uri="{909E8E84-426E-40DD-AFC4-6F175D3DCCD1}">
+              <a14:hiddenFill xmlns:a14="http://schemas.microsoft.com/office/drawing/2010/main">
+                <a:solidFill>
+                  <a:schemeClr val="accent1"/>
+                </a:solidFill>
+              </a14:hiddenFill>
+            </a:ext>
+            <a:ext uri="{91240B29-F687-4F45-9708-019B960494DF}">
+              <a14:hiddenLine xmlns:a14="http://schemas.microsoft.com/office/drawing/2010/main" w="9525">
+                <a:solidFill>
+                  <a:schemeClr val="tx1"/>
+                </a:solidFill>
+                <a:miter lim="800000"/>
+                <a:headEnd/>
+                <a:tailEnd/>
+              </a14:hiddenLine>
+            </a:ext>
+          </a:extLst>
+        </p:spPr>
+      </p:pic>
+    </p:spTree>
+    <p:extLst>
+      <p:ext uri="{BB962C8B-B14F-4D97-AF65-F5344CB8AC3E}">
+        <p14:creationId xmlns:p14="http://schemas.microsoft.com/office/powerpoint/2010/main" val="1100028522"/>
+      </p:ext>
+    </p:extLst>
+  </p:cSld>
+  <p:clrMapOvr>
+    <a:masterClrMapping/>
+  </p:clrMapOvr>
+  <p:timing>
+    <p:tnLst>
+      <p:par>
+        <p:cTn id="1" dur="indefinite" restart="never" nodeType="tmRoot"/>
+      </p:par>
+    </p:tnLst>
+  </p:timing>
+</p:sld>
+</file>
+
+<file path=ppt/slides/slide21.xml><?xml version="1.0" encoding="utf-8"?>
+<p:sld xmlns:a="http://schemas.openxmlformats.org/drawingml/2006/main" xmlns:r="http://schemas.openxmlformats.org/officeDocument/2006/relationships" xmlns:p="http://schemas.openxmlformats.org/presentationml/2006/main">
+  <p:cSld>
+    <p:spTree>
+      <p:nvGrpSpPr>
+        <p:cNvPr id="1" name=""/>
+        <p:cNvGrpSpPr/>
+        <p:nvPr/>
+      </p:nvGrpSpPr>
+      <p:grpSpPr>
+        <a:xfrm>
+          <a:off x="0" y="0"/>
+          <a:ext cx="0" cy="0"/>
+          <a:chOff x="0" y="0"/>
+          <a:chExt cx="0" cy="0"/>
+        </a:xfrm>
+      </p:grpSpPr>
+      <p:sp>
+        <p:nvSpPr>
+          <p:cNvPr id="2" name="Title 1"/>
+          <p:cNvSpPr>
+            <a:spLocks noGrp="1"/>
+          </p:cNvSpPr>
+          <p:nvPr>
+            <p:ph type="title"/>
+          </p:nvPr>
+        </p:nvSpPr>
+        <p:spPr/>
+        <p:txBody>
+          <a:bodyPr/>
+          <a:lstStyle/>
+          <a:p>
+            <a:r>
+              <a:rPr lang="da-DK" dirty="0" err="1" smtClean="0"/>
+              <a:t>What</a:t>
+            </a:r>
+            <a:r>
+              <a:rPr lang="da-DK" dirty="0" smtClean="0"/>
+              <a:t> have I changed?</a:t>
+            </a:r>
+            <a:endParaRPr lang="da-DK" dirty="0"/>
+          </a:p>
+        </p:txBody>
+      </p:sp>
+      <p:pic>
+        <p:nvPicPr>
+          <p:cNvPr id="2050" name="Picture 2"/>
+          <p:cNvPicPr>
+            <a:picLocks noChangeAspect="1" noChangeArrowheads="1"/>
+          </p:cNvPicPr>
+          <p:nvPr/>
+        </p:nvPicPr>
+        <p:blipFill>
+          <a:blip r:embed="rId2">
+            <a:extLst>
+              <a:ext uri="{28A0092B-C50C-407E-A947-70E740481C1C}">
+                <a14:useLocalDpi xmlns:a14="http://schemas.microsoft.com/office/drawing/2010/main" val="0"/>
+              </a:ext>
+            </a:extLst>
+          </a:blip>
+          <a:srcRect/>
+          <a:stretch>
+            <a:fillRect/>
+          </a:stretch>
+        </p:blipFill>
+        <p:spPr bwMode="auto">
+          <a:xfrm>
+            <a:off x="1471613" y="2204864"/>
+            <a:ext cx="6200775" cy="2695575"/>
+          </a:xfrm>
+          <a:prstGeom prst="rect">
+            <a:avLst/>
+          </a:prstGeom>
+          <a:noFill/>
+          <a:ln>
+            <a:noFill/>
+          </a:ln>
+          <a:extLst>
+            <a:ext uri="{909E8E84-426E-40DD-AFC4-6F175D3DCCD1}">
+              <a14:hiddenFill xmlns:a14="http://schemas.microsoft.com/office/drawing/2010/main">
+                <a:solidFill>
+                  <a:schemeClr val="accent1"/>
+                </a:solidFill>
+              </a14:hiddenFill>
+            </a:ext>
+            <a:ext uri="{91240B29-F687-4F45-9708-019B960494DF}">
+              <a14:hiddenLine xmlns:a14="http://schemas.microsoft.com/office/drawing/2010/main" w="9525">
+                <a:solidFill>
+                  <a:schemeClr val="tx1"/>
+                </a:solidFill>
+                <a:miter lim="800000"/>
+                <a:headEnd/>
+                <a:tailEnd/>
+              </a14:hiddenLine>
+            </a:ext>
+          </a:extLst>
+        </p:spPr>
+      </p:pic>
+    </p:spTree>
+    <p:extLst>
+      <p:ext uri="{BB962C8B-B14F-4D97-AF65-F5344CB8AC3E}">
+        <p14:creationId xmlns:p14="http://schemas.microsoft.com/office/powerpoint/2010/main" val="3792821914"/>
+      </p:ext>
+    </p:extLst>
+  </p:cSld>
+  <p:clrMapOvr>
+    <a:masterClrMapping/>
+  </p:clrMapOvr>
+  <p:timing>
+    <p:tnLst>
+      <p:par>
+        <p:cTn id="1" dur="indefinite" restart="never" nodeType="tmRoot"/>
+      </p:par>
+    </p:tnLst>
+  </p:timing>
+</p:sld>
+</file>
+
+<file path=ppt/slides/slide22.xml><?xml version="1.0" encoding="utf-8"?>
+<p:sld xmlns:a="http://schemas.openxmlformats.org/drawingml/2006/main" xmlns:r="http://schemas.openxmlformats.org/officeDocument/2006/relationships" xmlns:p="http://schemas.openxmlformats.org/presentationml/2006/main">
+  <p:cSld>
+    <p:spTree>
+      <p:nvGrpSpPr>
+        <p:cNvPr id="1" name=""/>
+        <p:cNvGrpSpPr/>
+        <p:nvPr/>
+      </p:nvGrpSpPr>
+      <p:grpSpPr>
+        <a:xfrm>
+          <a:off x="0" y="0"/>
+          <a:ext cx="0" cy="0"/>
+          <a:chOff x="0" y="0"/>
+          <a:chExt cx="0" cy="0"/>
+        </a:xfrm>
+      </p:grpSpPr>
+      <p:sp>
+        <p:nvSpPr>
+          <p:cNvPr id="2" name="Title 1"/>
+          <p:cNvSpPr>
+            <a:spLocks noGrp="1"/>
+          </p:cNvSpPr>
+          <p:nvPr>
+            <p:ph type="title"/>
+          </p:nvPr>
+        </p:nvSpPr>
+        <p:spPr/>
+        <p:txBody>
+          <a:bodyPr/>
+          <a:lstStyle/>
+          <a:p>
+            <a:r>
+              <a:rPr lang="da-DK" dirty="0" err="1" smtClean="0"/>
+              <a:t>Rebase</a:t>
+            </a:r>
+            <a:endParaRPr lang="da-DK" dirty="0"/>
+          </a:p>
+        </p:txBody>
+      </p:sp>
+      <p:pic>
+        <p:nvPicPr>
+          <p:cNvPr id="3075" name="Picture 3"/>
+          <p:cNvPicPr>
+            <a:picLocks noChangeAspect="1" noChangeArrowheads="1"/>
+          </p:cNvPicPr>
+          <p:nvPr/>
+        </p:nvPicPr>
+        <p:blipFill>
+          <a:blip r:embed="rId2">
+            <a:extLst>
+              <a:ext uri="{28A0092B-C50C-407E-A947-70E740481C1C}">
+                <a14:useLocalDpi xmlns:a14="http://schemas.microsoft.com/office/drawing/2010/main" val="0"/>
+              </a:ext>
+            </a:extLst>
+          </a:blip>
+          <a:srcRect/>
+          <a:stretch>
+            <a:fillRect/>
+          </a:stretch>
+        </p:blipFill>
+        <p:spPr bwMode="auto">
+          <a:xfrm>
+            <a:off x="1447800" y="1643063"/>
+            <a:ext cx="6248400" cy="3571875"/>
+          </a:xfrm>
+          <a:prstGeom prst="rect">
+            <a:avLst/>
+          </a:prstGeom>
+          <a:noFill/>
+          <a:ln>
+            <a:noFill/>
+          </a:ln>
+          <a:extLst>
+            <a:ext uri="{909E8E84-426E-40DD-AFC4-6F175D3DCCD1}">
+              <a14:hiddenFill xmlns:a14="http://schemas.microsoft.com/office/drawing/2010/main">
+                <a:solidFill>
+                  <a:schemeClr val="accent1"/>
+                </a:solidFill>
+              </a14:hiddenFill>
+            </a:ext>
+            <a:ext uri="{91240B29-F687-4F45-9708-019B960494DF}">
+              <a14:hiddenLine xmlns:a14="http://schemas.microsoft.com/office/drawing/2010/main" w="9525">
+                <a:solidFill>
+                  <a:schemeClr val="tx1"/>
+                </a:solidFill>
+                <a:miter lim="800000"/>
+                <a:headEnd/>
+                <a:tailEnd/>
+              </a14:hiddenLine>
+            </a:ext>
+          </a:extLst>
+        </p:spPr>
+      </p:pic>
+    </p:spTree>
+    <p:extLst>
+      <p:ext uri="{BB962C8B-B14F-4D97-AF65-F5344CB8AC3E}">
+        <p14:creationId xmlns:p14="http://schemas.microsoft.com/office/powerpoint/2010/main" val="1023273681"/>
+      </p:ext>
+    </p:extLst>
+  </p:cSld>
+  <p:clrMapOvr>
+    <a:masterClrMapping/>
+  </p:clrMapOvr>
+  <p:timing>
+    <p:tnLst>
+      <p:par>
+        <p:cTn id="1" dur="indefinite" restart="never" nodeType="tmRoot"/>
+      </p:par>
+    </p:tnLst>
+  </p:timing>
+</p:sld>
+</file>
+
+<file path=ppt/slides/slide23.xml><?xml version="1.0" encoding="utf-8"?>
+<p:sld xmlns:a="http://schemas.openxmlformats.org/drawingml/2006/main" xmlns:r="http://schemas.openxmlformats.org/officeDocument/2006/relationships" xmlns:p="http://schemas.openxmlformats.org/presentationml/2006/main">
+  <p:cSld>
+    <p:spTree>
+      <p:nvGrpSpPr>
+        <p:cNvPr id="1" name=""/>
+        <p:cNvGrpSpPr/>
+        <p:nvPr/>
+      </p:nvGrpSpPr>
+      <p:grpSpPr>
+        <a:xfrm>
+          <a:off x="0" y="0"/>
+          <a:ext cx="0" cy="0"/>
+          <a:chOff x="0" y="0"/>
+          <a:chExt cx="0" cy="0"/>
+        </a:xfrm>
+      </p:grpSpPr>
+      <p:sp>
+        <p:nvSpPr>
+          <p:cNvPr id="2" name="Title 1"/>
+          <p:cNvSpPr>
+            <a:spLocks noGrp="1"/>
+          </p:cNvSpPr>
+          <p:nvPr>
+            <p:ph type="title"/>
+          </p:nvPr>
+        </p:nvSpPr>
+        <p:spPr/>
+        <p:txBody>
+          <a:bodyPr/>
+          <a:lstStyle/>
+          <a:p>
+            <a:r>
+              <a:rPr lang="da-DK" dirty="0" smtClean="0"/>
+              <a:t>”Perler på en snor”</a:t>
+            </a:r>
+            <a:endParaRPr lang="da-DK" dirty="0"/>
+          </a:p>
+        </p:txBody>
+      </p:sp>
+      <p:pic>
+        <p:nvPicPr>
+          <p:cNvPr id="4098" name="Picture 2"/>
+          <p:cNvPicPr>
+            <a:picLocks noChangeAspect="1" noChangeArrowheads="1"/>
+          </p:cNvPicPr>
+          <p:nvPr/>
+        </p:nvPicPr>
+        <p:blipFill>
+          <a:blip r:embed="rId2">
+            <a:extLst>
+              <a:ext uri="{28A0092B-C50C-407E-A947-70E740481C1C}">
+                <a14:useLocalDpi xmlns:a14="http://schemas.microsoft.com/office/drawing/2010/main" val="0"/>
+              </a:ext>
+            </a:extLst>
+          </a:blip>
+          <a:srcRect/>
+          <a:stretch>
+            <a:fillRect/>
+          </a:stretch>
+        </p:blipFill>
+        <p:spPr bwMode="auto">
+          <a:xfrm>
+            <a:off x="1519238" y="2476500"/>
+            <a:ext cx="6105525" cy="1905000"/>
+          </a:xfrm>
+          <a:prstGeom prst="rect">
+            <a:avLst/>
+          </a:prstGeom>
+          <a:noFill/>
+          <a:ln>
+            <a:noFill/>
+          </a:ln>
+          <a:extLst>
+            <a:ext uri="{909E8E84-426E-40DD-AFC4-6F175D3DCCD1}">
+              <a14:hiddenFill xmlns:a14="http://schemas.microsoft.com/office/drawing/2010/main">
+                <a:solidFill>
+                  <a:schemeClr val="accent1"/>
+                </a:solidFill>
+              </a14:hiddenFill>
+            </a:ext>
+            <a:ext uri="{91240B29-F687-4F45-9708-019B960494DF}">
+              <a14:hiddenLine xmlns:a14="http://schemas.microsoft.com/office/drawing/2010/main" w="9525">
+                <a:solidFill>
+                  <a:schemeClr val="tx1"/>
+                </a:solidFill>
+                <a:miter lim="800000"/>
+                <a:headEnd/>
+                <a:tailEnd/>
+              </a14:hiddenLine>
+            </a:ext>
+          </a:extLst>
+        </p:spPr>
+      </p:pic>
+    </p:spTree>
+    <p:extLst>
+      <p:ext uri="{BB962C8B-B14F-4D97-AF65-F5344CB8AC3E}">
+        <p14:creationId xmlns:p14="http://schemas.microsoft.com/office/powerpoint/2010/main" val="3301936315"/>
+      </p:ext>
+    </p:extLst>
+  </p:cSld>
+  <p:clrMapOvr>
+    <a:masterClrMapping/>
+  </p:clrMapOvr>
+  <p:timing>
+    <p:tnLst>
+      <p:par>
+        <p:cTn id="1" dur="indefinite" restart="never" nodeType="tmRoot"/>
+      </p:par>
+    </p:tnLst>
+  </p:timing>
+</p:sld>
+</file>
+
+<file path=ppt/slides/slide24.xml><?xml version="1.0" encoding="utf-8"?>
+<p:sld xmlns:a="http://schemas.openxmlformats.org/drawingml/2006/main" xmlns:r="http://schemas.openxmlformats.org/officeDocument/2006/relationships" xmlns:p="http://schemas.openxmlformats.org/presentationml/2006/main">
+  <p:cSld>
+    <p:spTree>
+      <p:nvGrpSpPr>
+        <p:cNvPr id="1" name=""/>
+        <p:cNvGrpSpPr/>
+        <p:nvPr/>
+      </p:nvGrpSpPr>
+      <p:grpSpPr>
+        <a:xfrm>
+          <a:off x="0" y="0"/>
+          <a:ext cx="0" cy="0"/>
+          <a:chOff x="0" y="0"/>
+          <a:chExt cx="0" cy="0"/>
+        </a:xfrm>
+      </p:grpSpPr>
+      <p:sp>
+        <p:nvSpPr>
+          <p:cNvPr id="2" name="Title 1"/>
+          <p:cNvSpPr>
+            <a:spLocks noGrp="1"/>
+          </p:cNvSpPr>
+          <p:nvPr>
+            <p:ph type="title"/>
+          </p:nvPr>
+        </p:nvSpPr>
+        <p:spPr/>
+        <p:txBody>
+          <a:bodyPr/>
+          <a:lstStyle/>
+          <a:p>
+            <a:r>
+              <a:rPr lang="da-DK" dirty="0" err="1" smtClean="0"/>
+              <a:t>Completed</a:t>
+            </a:r>
+            <a:r>
+              <a:rPr lang="da-DK" dirty="0" smtClean="0"/>
+              <a:t> </a:t>
+            </a:r>
+            <a:r>
+              <a:rPr lang="da-DK" dirty="0" err="1" smtClean="0"/>
+              <a:t>work</a:t>
+            </a:r>
+            <a:r>
+              <a:rPr lang="da-DK" dirty="0" smtClean="0"/>
+              <a:t> on a </a:t>
+            </a:r>
+            <a:r>
+              <a:rPr lang="da-DK" dirty="0" err="1" smtClean="0"/>
+              <a:t>branch</a:t>
+            </a:r>
+            <a:endParaRPr lang="da-DK" dirty="0"/>
+          </a:p>
+        </p:txBody>
+      </p:sp>
+      <p:pic>
+        <p:nvPicPr>
+          <p:cNvPr id="5122" name="Picture 2"/>
+          <p:cNvPicPr>
+            <a:picLocks noChangeAspect="1" noChangeArrowheads="1"/>
+          </p:cNvPicPr>
+          <p:nvPr/>
+        </p:nvPicPr>
+        <p:blipFill>
+          <a:blip r:embed="rId2">
+            <a:extLst>
+              <a:ext uri="{28A0092B-C50C-407E-A947-70E740481C1C}">
+                <a14:useLocalDpi xmlns:a14="http://schemas.microsoft.com/office/drawing/2010/main" val="0"/>
+              </a:ext>
+            </a:extLst>
+          </a:blip>
+          <a:srcRect/>
+          <a:stretch>
+            <a:fillRect/>
+          </a:stretch>
+        </p:blipFill>
+        <p:spPr bwMode="auto">
+          <a:xfrm>
+            <a:off x="576263" y="1700808"/>
+            <a:ext cx="7991475" cy="4657725"/>
+          </a:xfrm>
+          <a:prstGeom prst="rect">
+            <a:avLst/>
+          </a:prstGeom>
+          <a:noFill/>
+          <a:ln>
+            <a:noFill/>
+          </a:ln>
+          <a:extLst>
+            <a:ext uri="{909E8E84-426E-40DD-AFC4-6F175D3DCCD1}">
+              <a14:hiddenFill xmlns:a14="http://schemas.microsoft.com/office/drawing/2010/main">
+                <a:solidFill>
+                  <a:schemeClr val="accent1"/>
+                </a:solidFill>
+              </a14:hiddenFill>
+            </a:ext>
+            <a:ext uri="{91240B29-F687-4F45-9708-019B960494DF}">
+              <a14:hiddenLine xmlns:a14="http://schemas.microsoft.com/office/drawing/2010/main" w="9525">
+                <a:solidFill>
+                  <a:schemeClr val="tx1"/>
+                </a:solidFill>
+                <a:miter lim="800000"/>
+                <a:headEnd/>
+                <a:tailEnd/>
+              </a14:hiddenLine>
+            </a:ext>
+          </a:extLst>
+        </p:spPr>
+      </p:pic>
+    </p:spTree>
+    <p:extLst>
+      <p:ext uri="{BB962C8B-B14F-4D97-AF65-F5344CB8AC3E}">
+        <p14:creationId xmlns:p14="http://schemas.microsoft.com/office/powerpoint/2010/main" val="3980195916"/>
+      </p:ext>
+    </p:extLst>
+  </p:cSld>
+  <p:clrMapOvr>
+    <a:masterClrMapping/>
+  </p:clrMapOvr>
 </p:sld>
 </file>
 
@@ -4629,6 +5812,13 @@
   <p:clrMapOvr>
     <a:masterClrMapping/>
   </p:clrMapOvr>
+  <p:timing>
+    <p:tnLst>
+      <p:par>
+        <p:cTn id="1" dur="indefinite" restart="never" nodeType="tmRoot"/>
+      </p:par>
+    </p:tnLst>
+  </p:timing>
 </p:sld>
 </file>
 
@@ -4752,6 +5942,13 @@
   <p:clrMapOvr>
     <a:masterClrMapping/>
   </p:clrMapOvr>
+  <p:timing>
+    <p:tnLst>
+      <p:par>
+        <p:cTn id="1" dur="indefinite" restart="never" nodeType="tmRoot"/>
+      </p:par>
+    </p:tnLst>
+  </p:timing>
 </p:sld>
 </file>
 
@@ -4871,6 +6068,13 @@
   <p:clrMapOvr>
     <a:masterClrMapping/>
   </p:clrMapOvr>
+  <p:timing>
+    <p:tnLst>
+      <p:par>
+        <p:cTn id="1" dur="indefinite" restart="never" nodeType="tmRoot"/>
+      </p:par>
+    </p:tnLst>
+  </p:timing>
 </p:sld>
 </file>
 

</xml_diff>

<commit_message>
Update git rebase examples.
</commit_message>
<xml_diff>
--- a/GitRebase.pptx
+++ b/GitRebase.pptx
@@ -10,28 +10,29 @@
     <p:sldId id="258" r:id="rId4"/>
     <p:sldId id="260" r:id="rId5"/>
     <p:sldId id="262" r:id="rId6"/>
-    <p:sldId id="263" r:id="rId7"/>
-    <p:sldId id="265" r:id="rId8"/>
-    <p:sldId id="266" r:id="rId9"/>
-    <p:sldId id="267" r:id="rId10"/>
-    <p:sldId id="268" r:id="rId11"/>
-    <p:sldId id="269" r:id="rId12"/>
-    <p:sldId id="270" r:id="rId13"/>
-    <p:sldId id="271" r:id="rId14"/>
-    <p:sldId id="259" r:id="rId15"/>
-    <p:sldId id="264" r:id="rId16"/>
-    <p:sldId id="272" r:id="rId17"/>
-    <p:sldId id="273" r:id="rId18"/>
-    <p:sldId id="274" r:id="rId19"/>
-    <p:sldId id="275" r:id="rId20"/>
-    <p:sldId id="276" r:id="rId21"/>
-    <p:sldId id="277" r:id="rId22"/>
-    <p:sldId id="278" r:id="rId23"/>
-    <p:sldId id="279" r:id="rId24"/>
-    <p:sldId id="280" r:id="rId25"/>
-    <p:sldId id="281" r:id="rId26"/>
-    <p:sldId id="282" r:id="rId27"/>
-    <p:sldId id="283" r:id="rId28"/>
+    <p:sldId id="272" r:id="rId7"/>
+    <p:sldId id="263" r:id="rId8"/>
+    <p:sldId id="265" r:id="rId9"/>
+    <p:sldId id="266" r:id="rId10"/>
+    <p:sldId id="267" r:id="rId11"/>
+    <p:sldId id="268" r:id="rId12"/>
+    <p:sldId id="269" r:id="rId13"/>
+    <p:sldId id="270" r:id="rId14"/>
+    <p:sldId id="271" r:id="rId15"/>
+    <p:sldId id="259" r:id="rId16"/>
+    <p:sldId id="264" r:id="rId17"/>
+    <p:sldId id="284" r:id="rId18"/>
+    <p:sldId id="273" r:id="rId19"/>
+    <p:sldId id="274" r:id="rId20"/>
+    <p:sldId id="275" r:id="rId21"/>
+    <p:sldId id="276" r:id="rId22"/>
+    <p:sldId id="277" r:id="rId23"/>
+    <p:sldId id="278" r:id="rId24"/>
+    <p:sldId id="279" r:id="rId25"/>
+    <p:sldId id="280" r:id="rId26"/>
+    <p:sldId id="281" r:id="rId27"/>
+    <p:sldId id="282" r:id="rId28"/>
+    <p:sldId id="283" r:id="rId29"/>
   </p:sldIdLst>
   <p:sldSz cx="9144000" cy="6858000" type="screen4x3"/>
   <p:notesSz cx="6858000" cy="9144000"/>
@@ -314,7 +315,7 @@
           <a:p>
             <a:fld id="{771B25BF-5C0F-44FE-A8BE-A26563C3AF39}" type="datetimeFigureOut">
               <a:rPr lang="da-DK" smtClean="0"/>
-              <a:t>02-05-2013</a:t>
+              <a:t>03-05-2013</a:t>
             </a:fld>
             <a:endParaRPr lang="da-DK"/>
           </a:p>
@@ -484,7 +485,7 @@
           <a:p>
             <a:fld id="{771B25BF-5C0F-44FE-A8BE-A26563C3AF39}" type="datetimeFigureOut">
               <a:rPr lang="da-DK" smtClean="0"/>
-              <a:t>02-05-2013</a:t>
+              <a:t>03-05-2013</a:t>
             </a:fld>
             <a:endParaRPr lang="da-DK"/>
           </a:p>
@@ -664,7 +665,7 @@
           <a:p>
             <a:fld id="{771B25BF-5C0F-44FE-A8BE-A26563C3AF39}" type="datetimeFigureOut">
               <a:rPr lang="da-DK" smtClean="0"/>
-              <a:t>02-05-2013</a:t>
+              <a:t>03-05-2013</a:t>
             </a:fld>
             <a:endParaRPr lang="da-DK"/>
           </a:p>
@@ -834,7 +835,7 @@
           <a:p>
             <a:fld id="{771B25BF-5C0F-44FE-A8BE-A26563C3AF39}" type="datetimeFigureOut">
               <a:rPr lang="da-DK" smtClean="0"/>
-              <a:t>02-05-2013</a:t>
+              <a:t>03-05-2013</a:t>
             </a:fld>
             <a:endParaRPr lang="da-DK"/>
           </a:p>
@@ -1080,7 +1081,7 @@
           <a:p>
             <a:fld id="{771B25BF-5C0F-44FE-A8BE-A26563C3AF39}" type="datetimeFigureOut">
               <a:rPr lang="da-DK" smtClean="0"/>
-              <a:t>02-05-2013</a:t>
+              <a:t>03-05-2013</a:t>
             </a:fld>
             <a:endParaRPr lang="da-DK"/>
           </a:p>
@@ -1368,7 +1369,7 @@
           <a:p>
             <a:fld id="{771B25BF-5C0F-44FE-A8BE-A26563C3AF39}" type="datetimeFigureOut">
               <a:rPr lang="da-DK" smtClean="0"/>
-              <a:t>02-05-2013</a:t>
+              <a:t>03-05-2013</a:t>
             </a:fld>
             <a:endParaRPr lang="da-DK"/>
           </a:p>
@@ -1790,7 +1791,7 @@
           <a:p>
             <a:fld id="{771B25BF-5C0F-44FE-A8BE-A26563C3AF39}" type="datetimeFigureOut">
               <a:rPr lang="da-DK" smtClean="0"/>
-              <a:t>02-05-2013</a:t>
+              <a:t>03-05-2013</a:t>
             </a:fld>
             <a:endParaRPr lang="da-DK"/>
           </a:p>
@@ -1908,7 +1909,7 @@
           <a:p>
             <a:fld id="{771B25BF-5C0F-44FE-A8BE-A26563C3AF39}" type="datetimeFigureOut">
               <a:rPr lang="da-DK" smtClean="0"/>
-              <a:t>02-05-2013</a:t>
+              <a:t>03-05-2013</a:t>
             </a:fld>
             <a:endParaRPr lang="da-DK"/>
           </a:p>
@@ -2003,7 +2004,7 @@
           <a:p>
             <a:fld id="{771B25BF-5C0F-44FE-A8BE-A26563C3AF39}" type="datetimeFigureOut">
               <a:rPr lang="da-DK" smtClean="0"/>
-              <a:t>02-05-2013</a:t>
+              <a:t>03-05-2013</a:t>
             </a:fld>
             <a:endParaRPr lang="da-DK"/>
           </a:p>
@@ -2280,7 +2281,7 @@
           <a:p>
             <a:fld id="{771B25BF-5C0F-44FE-A8BE-A26563C3AF39}" type="datetimeFigureOut">
               <a:rPr lang="da-DK" smtClean="0"/>
-              <a:t>02-05-2013</a:t>
+              <a:t>03-05-2013</a:t>
             </a:fld>
             <a:endParaRPr lang="da-DK"/>
           </a:p>
@@ -2533,7 +2534,7 @@
           <a:p>
             <a:fld id="{771B25BF-5C0F-44FE-A8BE-A26563C3AF39}" type="datetimeFigureOut">
               <a:rPr lang="da-DK" smtClean="0"/>
-              <a:t>02-05-2013</a:t>
+              <a:t>03-05-2013</a:t>
             </a:fld>
             <a:endParaRPr lang="da-DK"/>
           </a:p>
@@ -2746,7 +2747,7 @@
           <a:p>
             <a:fld id="{771B25BF-5C0F-44FE-A8BE-A26563C3AF39}" type="datetimeFigureOut">
               <a:rPr lang="da-DK" smtClean="0"/>
-              <a:t>02-05-2013</a:t>
+              <a:t>03-05-2013</a:t>
             </a:fld>
             <a:endParaRPr lang="da-DK"/>
           </a:p>
@@ -3254,6 +3255,132 @@
           <a:lstStyle/>
           <a:p>
             <a:r>
+              <a:rPr lang="da-DK" dirty="0" smtClean="0"/>
+              <a:t>The </a:t>
+            </a:r>
+            <a:r>
+              <a:rPr lang="da-DK" dirty="0" err="1" smtClean="0"/>
+              <a:t>coolest</a:t>
+            </a:r>
+            <a:r>
+              <a:rPr lang="da-DK" dirty="0" smtClean="0"/>
+              <a:t> </a:t>
+            </a:r>
+            <a:r>
+              <a:rPr lang="da-DK" dirty="0" err="1" smtClean="0"/>
+              <a:t>commit</a:t>
+            </a:r>
+            <a:endParaRPr lang="da-DK" dirty="0"/>
+          </a:p>
+        </p:txBody>
+      </p:sp>
+      <p:pic>
+        <p:nvPicPr>
+          <p:cNvPr id="8194" name="Picture 2"/>
+          <p:cNvPicPr>
+            <a:picLocks noChangeAspect="1" noChangeArrowheads="1"/>
+          </p:cNvPicPr>
+          <p:nvPr/>
+        </p:nvPicPr>
+        <p:blipFill>
+          <a:blip r:embed="rId2">
+            <a:extLst>
+              <a:ext uri="{28A0092B-C50C-407E-A947-70E740481C1C}">
+                <a14:useLocalDpi xmlns:a14="http://schemas.microsoft.com/office/drawing/2010/main" val="0"/>
+              </a:ext>
+            </a:extLst>
+          </a:blip>
+          <a:srcRect/>
+          <a:stretch>
+            <a:fillRect/>
+          </a:stretch>
+        </p:blipFill>
+        <p:spPr bwMode="auto">
+          <a:xfrm>
+            <a:off x="1566863" y="2709863"/>
+            <a:ext cx="6010275" cy="1438275"/>
+          </a:xfrm>
+          <a:prstGeom prst="rect">
+            <a:avLst/>
+          </a:prstGeom>
+          <a:noFill/>
+          <a:ln>
+            <a:noFill/>
+          </a:ln>
+          <a:extLst>
+            <a:ext uri="{909E8E84-426E-40DD-AFC4-6F175D3DCCD1}">
+              <a14:hiddenFill xmlns:a14="http://schemas.microsoft.com/office/drawing/2010/main">
+                <a:solidFill>
+                  <a:schemeClr val="accent1"/>
+                </a:solidFill>
+              </a14:hiddenFill>
+            </a:ext>
+            <a:ext uri="{91240B29-F687-4F45-9708-019B960494DF}">
+              <a14:hiddenLine xmlns:a14="http://schemas.microsoft.com/office/drawing/2010/main" w="9525">
+                <a:solidFill>
+                  <a:schemeClr val="tx1"/>
+                </a:solidFill>
+                <a:miter lim="800000"/>
+                <a:headEnd/>
+                <a:tailEnd/>
+              </a14:hiddenLine>
+            </a:ext>
+          </a:extLst>
+        </p:spPr>
+      </p:pic>
+    </p:spTree>
+    <p:extLst>
+      <p:ext uri="{BB962C8B-B14F-4D97-AF65-F5344CB8AC3E}">
+        <p14:creationId xmlns:p14="http://schemas.microsoft.com/office/powerpoint/2010/main" val="3384325657"/>
+      </p:ext>
+    </p:extLst>
+  </p:cSld>
+  <p:clrMapOvr>
+    <a:masterClrMapping/>
+  </p:clrMapOvr>
+  <p:timing>
+    <p:tnLst>
+      <p:par>
+        <p:cTn id="1" dur="indefinite" restart="never" nodeType="tmRoot"/>
+      </p:par>
+    </p:tnLst>
+  </p:timing>
+</p:sld>
+</file>
+
+<file path=ppt/slides/slide11.xml><?xml version="1.0" encoding="utf-8"?>
+<p:sld xmlns:a="http://schemas.openxmlformats.org/drawingml/2006/main" xmlns:r="http://schemas.openxmlformats.org/officeDocument/2006/relationships" xmlns:p="http://schemas.openxmlformats.org/presentationml/2006/main">
+  <p:cSld>
+    <p:spTree>
+      <p:nvGrpSpPr>
+        <p:cNvPr id="1" name=""/>
+        <p:cNvGrpSpPr/>
+        <p:nvPr/>
+      </p:nvGrpSpPr>
+      <p:grpSpPr>
+        <a:xfrm>
+          <a:off x="0" y="0"/>
+          <a:ext cx="0" cy="0"/>
+          <a:chOff x="0" y="0"/>
+          <a:chExt cx="0" cy="0"/>
+        </a:xfrm>
+      </p:grpSpPr>
+      <p:sp>
+        <p:nvSpPr>
+          <p:cNvPr id="2" name="Title 1"/>
+          <p:cNvSpPr>
+            <a:spLocks noGrp="1"/>
+          </p:cNvSpPr>
+          <p:nvPr>
+            <p:ph type="title"/>
+          </p:nvPr>
+        </p:nvSpPr>
+        <p:spPr/>
+        <p:txBody>
+          <a:bodyPr/>
+          <a:lstStyle/>
+          <a:p>
+            <a:r>
               <a:rPr lang="da-DK" dirty="0" err="1" smtClean="0"/>
               <a:t>cherry-pick</a:t>
             </a:r>
@@ -3335,7 +3462,7 @@
 </p:sld>
 </file>
 
-<file path=ppt/slides/slide11.xml><?xml version="1.0" encoding="utf-8"?>
+<file path=ppt/slides/slide12.xml><?xml version="1.0" encoding="utf-8"?>
 <p:sld xmlns:a="http://schemas.openxmlformats.org/drawingml/2006/main" xmlns:r="http://schemas.openxmlformats.org/officeDocument/2006/relationships" xmlns:p="http://schemas.openxmlformats.org/presentationml/2006/main">
   <p:cSld>
     <p:spTree>
@@ -3457,7 +3584,7 @@
 </p:sld>
 </file>
 
-<file path=ppt/slides/slide12.xml><?xml version="1.0" encoding="utf-8"?>
+<file path=ppt/slides/slide13.xml><?xml version="1.0" encoding="utf-8"?>
 <p:sld xmlns:a="http://schemas.openxmlformats.org/drawingml/2006/main" xmlns:r="http://schemas.openxmlformats.org/officeDocument/2006/relationships" xmlns:p="http://schemas.openxmlformats.org/presentationml/2006/main">
   <p:cSld>
     <p:spTree>
@@ -3571,7 +3698,7 @@
 </p:sld>
 </file>
 
-<file path=ppt/slides/slide13.xml><?xml version="1.0" encoding="utf-8"?>
+<file path=ppt/slides/slide14.xml><?xml version="1.0" encoding="utf-8"?>
 <p:sld xmlns:a="http://schemas.openxmlformats.org/drawingml/2006/main" xmlns:r="http://schemas.openxmlformats.org/officeDocument/2006/relationships" xmlns:p="http://schemas.openxmlformats.org/presentationml/2006/main">
   <p:cSld>
     <p:spTree>
@@ -3693,7 +3820,7 @@
 </p:sld>
 </file>
 
-<file path=ppt/slides/slide14.xml><?xml version="1.0" encoding="utf-8"?>
+<file path=ppt/slides/slide15.xml><?xml version="1.0" encoding="utf-8"?>
 <p:sld xmlns:a="http://schemas.openxmlformats.org/drawingml/2006/main" xmlns:r="http://schemas.openxmlformats.org/officeDocument/2006/relationships" xmlns:p="http://schemas.openxmlformats.org/presentationml/2006/main">
   <p:cSld>
     <p:spTree>
@@ -3844,7 +3971,7 @@
 </p:sld>
 </file>
 
-<file path=ppt/slides/slide15.xml><?xml version="1.0" encoding="utf-8"?>
+<file path=ppt/slides/slide16.xml><?xml version="1.0" encoding="utf-8"?>
 <p:sld xmlns:a="http://schemas.openxmlformats.org/drawingml/2006/main" xmlns:r="http://schemas.openxmlformats.org/officeDocument/2006/relationships" xmlns:p="http://schemas.openxmlformats.org/presentationml/2006/main">
   <p:cSld>
     <p:spTree>
@@ -3873,7 +4000,7 @@
         </p:nvSpPr>
         <p:spPr>
           <a:xfrm>
-            <a:off x="467544" y="2636912"/>
+            <a:off x="446856" y="2636912"/>
             <a:ext cx="8229600" cy="1143000"/>
           </a:xfrm>
         </p:spPr>
@@ -3888,20 +4015,8 @@
               <a:t>GIT as </a:t>
             </a:r>
             <a:r>
-              <a:rPr lang="da-DK" dirty="0" err="1" smtClean="0"/>
-              <a:t>your</a:t>
-            </a:r>
-            <a:r>
               <a:rPr lang="da-DK" dirty="0" smtClean="0"/>
-              <a:t> </a:t>
-            </a:r>
-            <a:r>
-              <a:rPr lang="da-DK" dirty="0" err="1" smtClean="0"/>
-              <a:t>best</a:t>
-            </a:r>
-            <a:r>
-              <a:rPr lang="da-DK" dirty="0" smtClean="0"/>
-              <a:t> </a:t>
+              <a:t>a true </a:t>
             </a:r>
             <a:r>
               <a:rPr lang="da-DK" dirty="0" err="1" smtClean="0"/>
@@ -3943,7 +4058,7 @@
             </a:r>
             <a:r>
               <a:rPr lang="da-DK" dirty="0" err="1" smtClean="0"/>
-              <a:t>changes</a:t>
+              <a:t>history</a:t>
             </a:r>
             <a:endParaRPr lang="da-DK" dirty="0"/>
           </a:p>
@@ -3969,7 +4084,7 @@
 </p:sld>
 </file>
 
-<file path=ppt/slides/slide16.xml><?xml version="1.0" encoding="utf-8"?>
+<file path=ppt/slides/slide17.xml><?xml version="1.0" encoding="utf-8"?>
 <p:sld xmlns:a="http://schemas.openxmlformats.org/drawingml/2006/main" xmlns:r="http://schemas.openxmlformats.org/officeDocument/2006/relationships" xmlns:p="http://schemas.openxmlformats.org/presentationml/2006/main">
   <p:cSld>
     <p:spTree>
@@ -4086,7 +4201,7 @@
     </p:spTree>
     <p:extLst>
       <p:ext uri="{BB962C8B-B14F-4D97-AF65-F5344CB8AC3E}">
-        <p14:creationId xmlns:p14="http://schemas.microsoft.com/office/powerpoint/2010/main" val="3640268507"/>
+        <p14:creationId xmlns:p14="http://schemas.microsoft.com/office/powerpoint/2010/main" val="1505370355"/>
       </p:ext>
     </p:extLst>
   </p:cSld>
@@ -4103,7 +4218,7 @@
 </p:sld>
 </file>
 
-<file path=ppt/slides/slide17.xml><?xml version="1.0" encoding="utf-8"?>
+<file path=ppt/slides/slide18.xml><?xml version="1.0" encoding="utf-8"?>
 <p:sld xmlns:a="http://schemas.openxmlformats.org/drawingml/2006/main" xmlns:r="http://schemas.openxmlformats.org/officeDocument/2006/relationships" xmlns:p="http://schemas.openxmlformats.org/presentationml/2006/main">
   <p:cSld>
     <p:spTree>
@@ -4217,7 +4332,7 @@
 </p:sld>
 </file>
 
-<file path=ppt/slides/slide18.xml><?xml version="1.0" encoding="utf-8"?>
+<file path=ppt/slides/slide19.xml><?xml version="1.0" encoding="utf-8"?>
 <p:sld xmlns:a="http://schemas.openxmlformats.org/drawingml/2006/main" xmlns:r="http://schemas.openxmlformats.org/officeDocument/2006/relationships" xmlns:p="http://schemas.openxmlformats.org/presentationml/2006/main">
   <p:cSld>
     <p:spTree>
@@ -4315,132 +4430,6 @@
     <p:extLst>
       <p:ext uri="{BB962C8B-B14F-4D97-AF65-F5344CB8AC3E}">
         <p14:creationId xmlns:p14="http://schemas.microsoft.com/office/powerpoint/2010/main" val="420560882"/>
-      </p:ext>
-    </p:extLst>
-  </p:cSld>
-  <p:clrMapOvr>
-    <a:masterClrMapping/>
-  </p:clrMapOvr>
-  <p:timing>
-    <p:tnLst>
-      <p:par>
-        <p:cTn id="1" dur="indefinite" restart="never" nodeType="tmRoot"/>
-      </p:par>
-    </p:tnLst>
-  </p:timing>
-</p:sld>
-</file>
-
-<file path=ppt/slides/slide19.xml><?xml version="1.0" encoding="utf-8"?>
-<p:sld xmlns:a="http://schemas.openxmlformats.org/drawingml/2006/main" xmlns:r="http://schemas.openxmlformats.org/officeDocument/2006/relationships" xmlns:p="http://schemas.openxmlformats.org/presentationml/2006/main">
-  <p:cSld>
-    <p:spTree>
-      <p:nvGrpSpPr>
-        <p:cNvPr id="1" name=""/>
-        <p:cNvGrpSpPr/>
-        <p:nvPr/>
-      </p:nvGrpSpPr>
-      <p:grpSpPr>
-        <a:xfrm>
-          <a:off x="0" y="0"/>
-          <a:ext cx="0" cy="0"/>
-          <a:chOff x="0" y="0"/>
-          <a:chExt cx="0" cy="0"/>
-        </a:xfrm>
-      </p:grpSpPr>
-      <p:sp>
-        <p:nvSpPr>
-          <p:cNvPr id="2" name="Title 1"/>
-          <p:cNvSpPr>
-            <a:spLocks noGrp="1"/>
-          </p:cNvSpPr>
-          <p:nvPr>
-            <p:ph type="title"/>
-          </p:nvPr>
-        </p:nvSpPr>
-        <p:spPr/>
-        <p:txBody>
-          <a:bodyPr/>
-          <a:lstStyle/>
-          <a:p>
-            <a:r>
-              <a:rPr lang="da-DK" dirty="0" smtClean="0"/>
-              <a:t>Edit / </a:t>
-            </a:r>
-            <a:r>
-              <a:rPr lang="da-DK" dirty="0" err="1" smtClean="0"/>
-              <a:t>insert</a:t>
-            </a:r>
-            <a:r>
-              <a:rPr lang="da-DK" dirty="0" smtClean="0"/>
-              <a:t> new </a:t>
-            </a:r>
-            <a:r>
-              <a:rPr lang="da-DK" dirty="0" err="1" smtClean="0"/>
-              <a:t>commits</a:t>
-            </a:r>
-            <a:endParaRPr lang="da-DK" dirty="0"/>
-          </a:p>
-        </p:txBody>
-      </p:sp>
-      <p:pic>
-        <p:nvPicPr>
-          <p:cNvPr id="15362" name="Picture 2"/>
-          <p:cNvPicPr>
-            <a:picLocks noChangeAspect="1" noChangeArrowheads="1"/>
-          </p:cNvPicPr>
-          <p:nvPr/>
-        </p:nvPicPr>
-        <p:blipFill>
-          <a:blip r:embed="rId2">
-            <a:extLst>
-              <a:ext uri="{28A0092B-C50C-407E-A947-70E740481C1C}">
-                <a14:useLocalDpi xmlns:a14="http://schemas.microsoft.com/office/drawing/2010/main" val="0"/>
-              </a:ext>
-            </a:extLst>
-          </a:blip>
-          <a:srcRect/>
-          <a:stretch>
-            <a:fillRect/>
-          </a:stretch>
-        </p:blipFill>
-        <p:spPr bwMode="auto">
-          <a:xfrm>
-            <a:off x="1504950" y="2185988"/>
-            <a:ext cx="6134100" cy="2486025"/>
-          </a:xfrm>
-          <a:prstGeom prst="rect">
-            <a:avLst/>
-          </a:prstGeom>
-          <a:noFill/>
-          <a:ln>
-            <a:noFill/>
-          </a:ln>
-          <a:extLst>
-            <a:ext uri="{909E8E84-426E-40DD-AFC4-6F175D3DCCD1}">
-              <a14:hiddenFill xmlns:a14="http://schemas.microsoft.com/office/drawing/2010/main">
-                <a:solidFill>
-                  <a:schemeClr val="accent1"/>
-                </a:solidFill>
-              </a14:hiddenFill>
-            </a:ext>
-            <a:ext uri="{91240B29-F687-4F45-9708-019B960494DF}">
-              <a14:hiddenLine xmlns:a14="http://schemas.microsoft.com/office/drawing/2010/main" w="9525">
-                <a:solidFill>
-                  <a:schemeClr val="tx1"/>
-                </a:solidFill>
-                <a:miter lim="800000"/>
-                <a:headEnd/>
-                <a:tailEnd/>
-              </a14:hiddenLine>
-            </a:ext>
-          </a:extLst>
-        </p:spPr>
-      </p:pic>
-    </p:spTree>
-    <p:extLst>
-      <p:ext uri="{BB962C8B-B14F-4D97-AF65-F5344CB8AC3E}">
-        <p14:creationId xmlns:p14="http://schemas.microsoft.com/office/powerpoint/2010/main" val="2325265513"/>
       </p:ext>
     </p:extLst>
   </p:cSld>
@@ -4618,6 +4607,132 @@
         </p:nvSpPr>
         <p:spPr/>
         <p:txBody>
+          <a:bodyPr/>
+          <a:lstStyle/>
+          <a:p>
+            <a:r>
+              <a:rPr lang="da-DK" dirty="0" smtClean="0"/>
+              <a:t>Edit / </a:t>
+            </a:r>
+            <a:r>
+              <a:rPr lang="da-DK" dirty="0" err="1" smtClean="0"/>
+              <a:t>insert</a:t>
+            </a:r>
+            <a:r>
+              <a:rPr lang="da-DK" dirty="0" smtClean="0"/>
+              <a:t> new </a:t>
+            </a:r>
+            <a:r>
+              <a:rPr lang="da-DK" dirty="0" err="1" smtClean="0"/>
+              <a:t>commits</a:t>
+            </a:r>
+            <a:endParaRPr lang="da-DK" dirty="0"/>
+          </a:p>
+        </p:txBody>
+      </p:sp>
+      <p:pic>
+        <p:nvPicPr>
+          <p:cNvPr id="15362" name="Picture 2"/>
+          <p:cNvPicPr>
+            <a:picLocks noChangeAspect="1" noChangeArrowheads="1"/>
+          </p:cNvPicPr>
+          <p:nvPr/>
+        </p:nvPicPr>
+        <p:blipFill>
+          <a:blip r:embed="rId2">
+            <a:extLst>
+              <a:ext uri="{28A0092B-C50C-407E-A947-70E740481C1C}">
+                <a14:useLocalDpi xmlns:a14="http://schemas.microsoft.com/office/drawing/2010/main" val="0"/>
+              </a:ext>
+            </a:extLst>
+          </a:blip>
+          <a:srcRect/>
+          <a:stretch>
+            <a:fillRect/>
+          </a:stretch>
+        </p:blipFill>
+        <p:spPr bwMode="auto">
+          <a:xfrm>
+            <a:off x="1504950" y="2185988"/>
+            <a:ext cx="6134100" cy="2486025"/>
+          </a:xfrm>
+          <a:prstGeom prst="rect">
+            <a:avLst/>
+          </a:prstGeom>
+          <a:noFill/>
+          <a:ln>
+            <a:noFill/>
+          </a:ln>
+          <a:extLst>
+            <a:ext uri="{909E8E84-426E-40DD-AFC4-6F175D3DCCD1}">
+              <a14:hiddenFill xmlns:a14="http://schemas.microsoft.com/office/drawing/2010/main">
+                <a:solidFill>
+                  <a:schemeClr val="accent1"/>
+                </a:solidFill>
+              </a14:hiddenFill>
+            </a:ext>
+            <a:ext uri="{91240B29-F687-4F45-9708-019B960494DF}">
+              <a14:hiddenLine xmlns:a14="http://schemas.microsoft.com/office/drawing/2010/main" w="9525">
+                <a:solidFill>
+                  <a:schemeClr val="tx1"/>
+                </a:solidFill>
+                <a:miter lim="800000"/>
+                <a:headEnd/>
+                <a:tailEnd/>
+              </a14:hiddenLine>
+            </a:ext>
+          </a:extLst>
+        </p:spPr>
+      </p:pic>
+    </p:spTree>
+    <p:extLst>
+      <p:ext uri="{BB962C8B-B14F-4D97-AF65-F5344CB8AC3E}">
+        <p14:creationId xmlns:p14="http://schemas.microsoft.com/office/powerpoint/2010/main" val="2325265513"/>
+      </p:ext>
+    </p:extLst>
+  </p:cSld>
+  <p:clrMapOvr>
+    <a:masterClrMapping/>
+  </p:clrMapOvr>
+  <p:timing>
+    <p:tnLst>
+      <p:par>
+        <p:cTn id="1" dur="indefinite" restart="never" nodeType="tmRoot"/>
+      </p:par>
+    </p:tnLst>
+  </p:timing>
+</p:sld>
+</file>
+
+<file path=ppt/slides/slide21.xml><?xml version="1.0" encoding="utf-8"?>
+<p:sld xmlns:a="http://schemas.openxmlformats.org/drawingml/2006/main" xmlns:r="http://schemas.openxmlformats.org/officeDocument/2006/relationships" xmlns:p="http://schemas.openxmlformats.org/presentationml/2006/main">
+  <p:cSld>
+    <p:spTree>
+      <p:nvGrpSpPr>
+        <p:cNvPr id="1" name=""/>
+        <p:cNvGrpSpPr/>
+        <p:nvPr/>
+      </p:nvGrpSpPr>
+      <p:grpSpPr>
+        <a:xfrm>
+          <a:off x="0" y="0"/>
+          <a:ext cx="0" cy="0"/>
+          <a:chOff x="0" y="0"/>
+          <a:chExt cx="0" cy="0"/>
+        </a:xfrm>
+      </p:grpSpPr>
+      <p:sp>
+        <p:nvSpPr>
+          <p:cNvPr id="2" name="Title 1"/>
+          <p:cNvSpPr>
+            <a:spLocks noGrp="1"/>
+          </p:cNvSpPr>
+          <p:nvPr>
+            <p:ph type="title"/>
+          </p:nvPr>
+        </p:nvSpPr>
+        <p:spPr/>
+        <p:txBody>
           <a:bodyPr>
             <a:normAutofit fontScale="90000"/>
           </a:bodyPr>
@@ -4745,7 +4860,7 @@
 </p:sld>
 </file>
 
-<file path=ppt/slides/slide21.xml><?xml version="1.0" encoding="utf-8"?>
+<file path=ppt/slides/slide22.xml><?xml version="1.0" encoding="utf-8"?>
 <p:sld xmlns:a="http://schemas.openxmlformats.org/drawingml/2006/main" xmlns:r="http://schemas.openxmlformats.org/officeDocument/2006/relationships" xmlns:p="http://schemas.openxmlformats.org/presentationml/2006/main">
   <p:cSld>
     <p:spTree>
@@ -4863,7 +4978,7 @@
 </p:sld>
 </file>
 
-<file path=ppt/slides/slide22.xml><?xml version="1.0" encoding="utf-8"?>
+<file path=ppt/slides/slide23.xml><?xml version="1.0" encoding="utf-8"?>
 <p:sld xmlns:a="http://schemas.openxmlformats.org/drawingml/2006/main" xmlns:r="http://schemas.openxmlformats.org/officeDocument/2006/relationships" xmlns:p="http://schemas.openxmlformats.org/presentationml/2006/main">
   <p:cSld>
     <p:spTree>
@@ -4977,7 +5092,7 @@
 </p:sld>
 </file>
 
-<file path=ppt/slides/slide23.xml><?xml version="1.0" encoding="utf-8"?>
+<file path=ppt/slides/slide24.xml><?xml version="1.0" encoding="utf-8"?>
 <p:sld xmlns:a="http://schemas.openxmlformats.org/drawingml/2006/main" xmlns:r="http://schemas.openxmlformats.org/officeDocument/2006/relationships" xmlns:p="http://schemas.openxmlformats.org/presentationml/2006/main">
   <p:cSld>
     <p:spTree>
@@ -5091,7 +5206,7 @@
 </p:sld>
 </file>
 
-<file path=ppt/slides/slide24.xml><?xml version="1.0" encoding="utf-8"?>
+<file path=ppt/slides/slide25.xml><?xml version="1.0" encoding="utf-8"?>
 <p:sld xmlns:a="http://schemas.openxmlformats.org/drawingml/2006/main" xmlns:r="http://schemas.openxmlformats.org/officeDocument/2006/relationships" xmlns:p="http://schemas.openxmlformats.org/presentationml/2006/main">
   <p:cSld>
     <p:spTree>
@@ -5211,10 +5326,17 @@
   <p:clrMapOvr>
     <a:masterClrMapping/>
   </p:clrMapOvr>
+  <p:timing>
+    <p:tnLst>
+      <p:par>
+        <p:cTn id="1" dur="indefinite" restart="never" nodeType="tmRoot"/>
+      </p:par>
+    </p:tnLst>
+  </p:timing>
 </p:sld>
 </file>
 
-<file path=ppt/slides/slide25.xml><?xml version="1.0" encoding="utf-8"?>
+<file path=ppt/slides/slide26.xml><?xml version="1.0" encoding="utf-8"?>
 <p:sld xmlns:a="http://schemas.openxmlformats.org/drawingml/2006/main" xmlns:r="http://schemas.openxmlformats.org/officeDocument/2006/relationships" xmlns:p="http://schemas.openxmlformats.org/presentationml/2006/main">
   <p:cSld>
     <p:spTree>
@@ -5330,10 +5452,17 @@
   <p:clrMapOvr>
     <a:masterClrMapping/>
   </p:clrMapOvr>
+  <p:timing>
+    <p:tnLst>
+      <p:par>
+        <p:cTn id="1" dur="indefinite" restart="never" nodeType="tmRoot"/>
+      </p:par>
+    </p:tnLst>
+  </p:timing>
 </p:sld>
 </file>
 
-<file path=ppt/slides/slide26.xml><?xml version="1.0" encoding="utf-8"?>
+<file path=ppt/slides/slide27.xml><?xml version="1.0" encoding="utf-8"?>
 <p:sld xmlns:a="http://schemas.openxmlformats.org/drawingml/2006/main" xmlns:r="http://schemas.openxmlformats.org/officeDocument/2006/relationships" xmlns:p="http://schemas.openxmlformats.org/presentationml/2006/main">
   <p:cSld>
     <p:spTree>
@@ -5451,10 +5580,17 @@
   <p:clrMapOvr>
     <a:masterClrMapping/>
   </p:clrMapOvr>
+  <p:timing>
+    <p:tnLst>
+      <p:par>
+        <p:cTn id="1" dur="indefinite" restart="never" nodeType="tmRoot"/>
+      </p:par>
+    </p:tnLst>
+  </p:timing>
 </p:sld>
 </file>
 
-<file path=ppt/slides/slide27.xml><?xml version="1.0" encoding="utf-8"?>
+<file path=ppt/slides/slide28.xml><?xml version="1.0" encoding="utf-8"?>
 <p:sld xmlns:a="http://schemas.openxmlformats.org/drawingml/2006/main" xmlns:r="http://schemas.openxmlformats.org/officeDocument/2006/relationships" xmlns:p="http://schemas.openxmlformats.org/presentationml/2006/main">
   <p:cSld>
     <p:spTree>
@@ -5562,6 +5698,13 @@
   <p:clrMapOvr>
     <a:masterClrMapping/>
   </p:clrMapOvr>
+  <p:timing>
+    <p:tnLst>
+      <p:par>
+        <p:cTn id="1" dur="indefinite" restart="never" nodeType="tmRoot"/>
+      </p:par>
+    </p:tnLst>
+  </p:timing>
 </p:sld>
 </file>
 
@@ -5980,6 +6123,124 @@
             <p:ph type="title"/>
           </p:nvPr>
         </p:nvSpPr>
+        <p:spPr/>
+        <p:txBody>
+          <a:bodyPr/>
+          <a:lstStyle/>
+          <a:p>
+            <a:r>
+              <a:rPr lang="da-DK" dirty="0" smtClean="0"/>
+              <a:t>Hacking </a:t>
+            </a:r>
+            <a:r>
+              <a:rPr lang="da-DK" dirty="0" err="1" smtClean="0"/>
+              <a:t>away</a:t>
+            </a:r>
+            <a:endParaRPr lang="da-DK" dirty="0"/>
+          </a:p>
+        </p:txBody>
+      </p:sp>
+      <p:pic>
+        <p:nvPicPr>
+          <p:cNvPr id="12293" name="Picture 5"/>
+          <p:cNvPicPr>
+            <a:picLocks noChangeAspect="1" noChangeArrowheads="1"/>
+          </p:cNvPicPr>
+          <p:nvPr/>
+        </p:nvPicPr>
+        <p:blipFill>
+          <a:blip r:embed="rId2">
+            <a:extLst>
+              <a:ext uri="{28A0092B-C50C-407E-A947-70E740481C1C}">
+                <a14:useLocalDpi xmlns:a14="http://schemas.microsoft.com/office/drawing/2010/main" val="0"/>
+              </a:ext>
+            </a:extLst>
+          </a:blip>
+          <a:srcRect/>
+          <a:stretch>
+            <a:fillRect/>
+          </a:stretch>
+        </p:blipFill>
+        <p:spPr bwMode="auto">
+          <a:xfrm>
+            <a:off x="1571625" y="2105025"/>
+            <a:ext cx="6000750" cy="2647950"/>
+          </a:xfrm>
+          <a:prstGeom prst="rect">
+            <a:avLst/>
+          </a:prstGeom>
+          <a:noFill/>
+          <a:ln>
+            <a:noFill/>
+          </a:ln>
+          <a:extLst>
+            <a:ext uri="{909E8E84-426E-40DD-AFC4-6F175D3DCCD1}">
+              <a14:hiddenFill xmlns:a14="http://schemas.microsoft.com/office/drawing/2010/main">
+                <a:solidFill>
+                  <a:schemeClr val="accent1"/>
+                </a:solidFill>
+              </a14:hiddenFill>
+            </a:ext>
+            <a:ext uri="{91240B29-F687-4F45-9708-019B960494DF}">
+              <a14:hiddenLine xmlns:a14="http://schemas.microsoft.com/office/drawing/2010/main" w="9525">
+                <a:solidFill>
+                  <a:schemeClr val="tx1"/>
+                </a:solidFill>
+                <a:miter lim="800000"/>
+                <a:headEnd/>
+                <a:tailEnd/>
+              </a14:hiddenLine>
+            </a:ext>
+          </a:extLst>
+        </p:spPr>
+      </p:pic>
+    </p:spTree>
+    <p:extLst>
+      <p:ext uri="{BB962C8B-B14F-4D97-AF65-F5344CB8AC3E}">
+        <p14:creationId xmlns:p14="http://schemas.microsoft.com/office/powerpoint/2010/main" val="3640268507"/>
+      </p:ext>
+    </p:extLst>
+  </p:cSld>
+  <p:clrMapOvr>
+    <a:masterClrMapping/>
+  </p:clrMapOvr>
+  <p:timing>
+    <p:tnLst>
+      <p:par>
+        <p:cTn id="1" dur="indefinite" restart="never" nodeType="tmRoot"/>
+      </p:par>
+    </p:tnLst>
+  </p:timing>
+</p:sld>
+</file>
+
+<file path=ppt/slides/slide7.xml><?xml version="1.0" encoding="utf-8"?>
+<p:sld xmlns:a="http://schemas.openxmlformats.org/drawingml/2006/main" xmlns:r="http://schemas.openxmlformats.org/officeDocument/2006/relationships" xmlns:p="http://schemas.openxmlformats.org/presentationml/2006/main">
+  <p:cSld>
+    <p:spTree>
+      <p:nvGrpSpPr>
+        <p:cNvPr id="1" name=""/>
+        <p:cNvGrpSpPr/>
+        <p:nvPr/>
+      </p:nvGrpSpPr>
+      <p:grpSpPr>
+        <a:xfrm>
+          <a:off x="0" y="0"/>
+          <a:ext cx="0" cy="0"/>
+          <a:chOff x="0" y="0"/>
+          <a:chExt cx="0" cy="0"/>
+        </a:xfrm>
+      </p:grpSpPr>
+      <p:sp>
+        <p:nvSpPr>
+          <p:cNvPr id="2" name="Title 1"/>
+          <p:cNvSpPr>
+            <a:spLocks noGrp="1"/>
+          </p:cNvSpPr>
+          <p:nvPr>
+            <p:ph type="title"/>
+          </p:nvPr>
+        </p:nvSpPr>
         <p:spPr>
           <a:xfrm>
             <a:off x="467544" y="2420888"/>
@@ -6054,7 +6315,7 @@
 </p:sld>
 </file>
 
-<file path=ppt/slides/slide7.xml><?xml version="1.0" encoding="utf-8"?>
+<file path=ppt/slides/slide8.xml><?xml version="1.0" encoding="utf-8"?>
 <p:sld xmlns:a="http://schemas.openxmlformats.org/drawingml/2006/main" xmlns:r="http://schemas.openxmlformats.org/officeDocument/2006/relationships" xmlns:p="http://schemas.openxmlformats.org/presentationml/2006/main">
   <p:cSld>
     <p:spTree>
@@ -6176,7 +6437,7 @@
 </p:sld>
 </file>
 
-<file path=ppt/slides/slide8.xml><?xml version="1.0" encoding="utf-8"?>
+<file path=ppt/slides/slide9.xml><?xml version="1.0" encoding="utf-8"?>
 <p:sld xmlns:a="http://schemas.openxmlformats.org/drawingml/2006/main" xmlns:r="http://schemas.openxmlformats.org/officeDocument/2006/relationships" xmlns:p="http://schemas.openxmlformats.org/presentationml/2006/main">
   <p:cSld>
     <p:spTree>
@@ -6290,132 +6551,6 @@
     <p:extLst>
       <p:ext uri="{BB962C8B-B14F-4D97-AF65-F5344CB8AC3E}">
         <p14:creationId xmlns:p14="http://schemas.microsoft.com/office/powerpoint/2010/main" val="1047603216"/>
-      </p:ext>
-    </p:extLst>
-  </p:cSld>
-  <p:clrMapOvr>
-    <a:masterClrMapping/>
-  </p:clrMapOvr>
-  <p:timing>
-    <p:tnLst>
-      <p:par>
-        <p:cTn id="1" dur="indefinite" restart="never" nodeType="tmRoot"/>
-      </p:par>
-    </p:tnLst>
-  </p:timing>
-</p:sld>
-</file>
-
-<file path=ppt/slides/slide9.xml><?xml version="1.0" encoding="utf-8"?>
-<p:sld xmlns:a="http://schemas.openxmlformats.org/drawingml/2006/main" xmlns:r="http://schemas.openxmlformats.org/officeDocument/2006/relationships" xmlns:p="http://schemas.openxmlformats.org/presentationml/2006/main">
-  <p:cSld>
-    <p:spTree>
-      <p:nvGrpSpPr>
-        <p:cNvPr id="1" name=""/>
-        <p:cNvGrpSpPr/>
-        <p:nvPr/>
-      </p:nvGrpSpPr>
-      <p:grpSpPr>
-        <a:xfrm>
-          <a:off x="0" y="0"/>
-          <a:ext cx="0" cy="0"/>
-          <a:chOff x="0" y="0"/>
-          <a:chExt cx="0" cy="0"/>
-        </a:xfrm>
-      </p:grpSpPr>
-      <p:sp>
-        <p:nvSpPr>
-          <p:cNvPr id="2" name="Title 1"/>
-          <p:cNvSpPr>
-            <a:spLocks noGrp="1"/>
-          </p:cNvSpPr>
-          <p:nvPr>
-            <p:ph type="title"/>
-          </p:nvPr>
-        </p:nvSpPr>
-        <p:spPr/>
-        <p:txBody>
-          <a:bodyPr/>
-          <a:lstStyle/>
-          <a:p>
-            <a:r>
-              <a:rPr lang="da-DK" dirty="0" smtClean="0"/>
-              <a:t>The </a:t>
-            </a:r>
-            <a:r>
-              <a:rPr lang="da-DK" dirty="0" err="1" smtClean="0"/>
-              <a:t>coolest</a:t>
-            </a:r>
-            <a:r>
-              <a:rPr lang="da-DK" dirty="0" smtClean="0"/>
-              <a:t> </a:t>
-            </a:r>
-            <a:r>
-              <a:rPr lang="da-DK" dirty="0" err="1" smtClean="0"/>
-              <a:t>commit</a:t>
-            </a:r>
-            <a:endParaRPr lang="da-DK" dirty="0"/>
-          </a:p>
-        </p:txBody>
-      </p:sp>
-      <p:pic>
-        <p:nvPicPr>
-          <p:cNvPr id="8194" name="Picture 2"/>
-          <p:cNvPicPr>
-            <a:picLocks noChangeAspect="1" noChangeArrowheads="1"/>
-          </p:cNvPicPr>
-          <p:nvPr/>
-        </p:nvPicPr>
-        <p:blipFill>
-          <a:blip r:embed="rId2">
-            <a:extLst>
-              <a:ext uri="{28A0092B-C50C-407E-A947-70E740481C1C}">
-                <a14:useLocalDpi xmlns:a14="http://schemas.microsoft.com/office/drawing/2010/main" val="0"/>
-              </a:ext>
-            </a:extLst>
-          </a:blip>
-          <a:srcRect/>
-          <a:stretch>
-            <a:fillRect/>
-          </a:stretch>
-        </p:blipFill>
-        <p:spPr bwMode="auto">
-          <a:xfrm>
-            <a:off x="1566863" y="2709863"/>
-            <a:ext cx="6010275" cy="1438275"/>
-          </a:xfrm>
-          <a:prstGeom prst="rect">
-            <a:avLst/>
-          </a:prstGeom>
-          <a:noFill/>
-          <a:ln>
-            <a:noFill/>
-          </a:ln>
-          <a:extLst>
-            <a:ext uri="{909E8E84-426E-40DD-AFC4-6F175D3DCCD1}">
-              <a14:hiddenFill xmlns:a14="http://schemas.microsoft.com/office/drawing/2010/main">
-                <a:solidFill>
-                  <a:schemeClr val="accent1"/>
-                </a:solidFill>
-              </a14:hiddenFill>
-            </a:ext>
-            <a:ext uri="{91240B29-F687-4F45-9708-019B960494DF}">
-              <a14:hiddenLine xmlns:a14="http://schemas.microsoft.com/office/drawing/2010/main" w="9525">
-                <a:solidFill>
-                  <a:schemeClr val="tx1"/>
-                </a:solidFill>
-                <a:miter lim="800000"/>
-                <a:headEnd/>
-                <a:tailEnd/>
-              </a14:hiddenLine>
-            </a:ext>
-          </a:extLst>
-        </p:spPr>
-      </p:pic>
-    </p:spTree>
-    <p:extLst>
-      <p:ext uri="{BB962C8B-B14F-4D97-AF65-F5344CB8AC3E}">
-        <p14:creationId xmlns:p14="http://schemas.microsoft.com/office/powerpoint/2010/main" val="3384325657"/>
       </p:ext>
     </p:extLst>
   </p:cSld>

</xml_diff>